<commit_message>
update scripts and some slides for improved explanation
</commit_message>
<xml_diff>
--- a/student_lessons/C_Sentiment_Unsupervised/Day3_liveA_SentimentReview.pptx
+++ b/student_lessons/C_Sentiment_Unsupervised/Day3_liveA_SentimentReview.pptx
@@ -5,7 +5,7 @@
     <p:sldMasterId id="2147483660" r:id="rId1"/>
   </p:sldMasterIdLst>
   <p:notesMasterIdLst>
-    <p:notesMasterId r:id="rId16"/>
+    <p:notesMasterId r:id="rId17"/>
   </p:notesMasterIdLst>
   <p:sldIdLst>
     <p:sldId id="836" r:id="rId2"/>
@@ -13,15 +13,16 @@
     <p:sldId id="808" r:id="rId4"/>
     <p:sldId id="833" r:id="rId5"/>
     <p:sldId id="834" r:id="rId6"/>
-    <p:sldId id="835" r:id="rId7"/>
-    <p:sldId id="832" r:id="rId8"/>
-    <p:sldId id="820" r:id="rId9"/>
-    <p:sldId id="819" r:id="rId10"/>
-    <p:sldId id="821" r:id="rId11"/>
-    <p:sldId id="740" r:id="rId12"/>
-    <p:sldId id="822" r:id="rId13"/>
-    <p:sldId id="823" r:id="rId14"/>
-    <p:sldId id="824" r:id="rId15"/>
+    <p:sldId id="837" r:id="rId7"/>
+    <p:sldId id="835" r:id="rId8"/>
+    <p:sldId id="832" r:id="rId9"/>
+    <p:sldId id="820" r:id="rId10"/>
+    <p:sldId id="819" r:id="rId11"/>
+    <p:sldId id="821" r:id="rId12"/>
+    <p:sldId id="740" r:id="rId13"/>
+    <p:sldId id="822" r:id="rId14"/>
+    <p:sldId id="823" r:id="rId15"/>
+    <p:sldId id="824" r:id="rId16"/>
   </p:sldIdLst>
   <p:sldSz cx="9144000" cy="6858000" type="screen4x3"/>
   <p:notesSz cx="6858000" cy="9144000"/>
@@ -5003,7 +5004,7 @@
           <a:p>
             <a:fld id="{B0C0A60C-850A-4EA4-9C14-A8FE98B94505}" type="datetimeFigureOut">
               <a:rPr lang="en-US" smtClean="0"/>
-              <a:t>1/10/21</a:t>
+              <a:t>6/15/21</a:t>
             </a:fld>
             <a:endParaRPr lang="en-US"/>
           </a:p>
@@ -5270,6 +5271,90 @@
 </p:notesMaster>
 </file>
 
+<file path=ppt/notesSlides/notesSlide1.xml><?xml version="1.0" encoding="utf-8"?>
+<p:notes xmlns:a="http://schemas.openxmlformats.org/drawingml/2006/main" xmlns:r="http://schemas.openxmlformats.org/officeDocument/2006/relationships" xmlns:p="http://schemas.openxmlformats.org/presentationml/2006/main">
+  <p:cSld>
+    <p:spTree>
+      <p:nvGrpSpPr>
+        <p:cNvPr id="1" name=""/>
+        <p:cNvGrpSpPr/>
+        <p:nvPr/>
+      </p:nvGrpSpPr>
+      <p:grpSpPr>
+        <a:xfrm>
+          <a:off x="0" y="0"/>
+          <a:ext cx="0" cy="0"/>
+          <a:chOff x="0" y="0"/>
+          <a:chExt cx="0" cy="0"/>
+        </a:xfrm>
+      </p:grpSpPr>
+      <p:sp>
+        <p:nvSpPr>
+          <p:cNvPr id="2" name="Slide Image Placeholder 1"/>
+          <p:cNvSpPr>
+            <a:spLocks noGrp="1" noRot="1" noChangeAspect="1"/>
+          </p:cNvSpPr>
+          <p:nvPr>
+            <p:ph type="sldImg"/>
+          </p:nvPr>
+        </p:nvSpPr>
+        <p:spPr/>
+      </p:sp>
+      <p:sp>
+        <p:nvSpPr>
+          <p:cNvPr id="3" name="Notes Placeholder 2"/>
+          <p:cNvSpPr>
+            <a:spLocks noGrp="1"/>
+          </p:cNvSpPr>
+          <p:nvPr>
+            <p:ph type="body" idx="1"/>
+          </p:nvPr>
+        </p:nvSpPr>
+        <p:spPr/>
+        <p:txBody>
+          <a:bodyPr/>
+          <a:lstStyle/>
+          <a:p>
+            <a:endParaRPr lang="en-US" dirty="0"/>
+          </a:p>
+        </p:txBody>
+      </p:sp>
+      <p:sp>
+        <p:nvSpPr>
+          <p:cNvPr id="4" name="Slide Number Placeholder 3"/>
+          <p:cNvSpPr>
+            <a:spLocks noGrp="1"/>
+          </p:cNvSpPr>
+          <p:nvPr>
+            <p:ph type="sldNum" sz="quarter" idx="5"/>
+          </p:nvPr>
+        </p:nvSpPr>
+        <p:spPr/>
+        <p:txBody>
+          <a:bodyPr/>
+          <a:lstStyle/>
+          <a:p>
+            <a:fld id="{24E9AA13-E3FC-4BB6-B68D-5F0F5803D716}" type="slidenum">
+              <a:rPr lang="en-US" smtClean="0"/>
+              <a:t>3</a:t>
+            </a:fld>
+            <a:endParaRPr lang="en-US"/>
+          </a:p>
+        </p:txBody>
+      </p:sp>
+    </p:spTree>
+    <p:extLst>
+      <p:ext uri="{BB962C8B-B14F-4D97-AF65-F5344CB8AC3E}">
+        <p14:creationId xmlns:p14="http://schemas.microsoft.com/office/powerpoint/2010/main" val="658354693"/>
+      </p:ext>
+    </p:extLst>
+  </p:cSld>
+  <p:clrMapOvr>
+    <a:masterClrMapping/>
+  </p:clrMapOvr>
+</p:notes>
+</file>
+
 <file path=ppt/slideLayouts/slideLayout1.xml><?xml version="1.0" encoding="utf-8"?>
 <p:sldLayout xmlns:a="http://schemas.openxmlformats.org/drawingml/2006/main" xmlns:r="http://schemas.openxmlformats.org/officeDocument/2006/relationships" xmlns:p="http://schemas.openxmlformats.org/presentationml/2006/main" type="title" preserve="1">
   <p:cSld name="Title Slide">
@@ -5402,7 +5487,7 @@
           <a:p>
             <a:fld id="{5738B90E-0779-4C36-915C-6F05FCD89456}" type="datetime1">
               <a:rPr lang="en-US" smtClean="0"/>
-              <a:t>1/10/21</a:t>
+              <a:t>6/15/21</a:t>
             </a:fld>
             <a:endParaRPr lang="en-US"/>
           </a:p>
@@ -5599,7 +5684,7 @@
           <a:p>
             <a:fld id="{7B9EA29D-D431-42FE-B7B6-AAE4454C77D3}" type="datetime1">
               <a:rPr lang="en-US" smtClean="0"/>
-              <a:t>1/10/21</a:t>
+              <a:t>6/15/21</a:t>
             </a:fld>
             <a:endParaRPr lang="en-US"/>
           </a:p>
@@ -5954,7 +6039,7 @@
           <a:p>
             <a:fld id="{690D8A1E-EA8F-46C1-B891-AE0C00D9C314}" type="datetime1">
               <a:rPr lang="en-US" smtClean="0"/>
-              <a:t>1/10/21</a:t>
+              <a:t>6/15/21</a:t>
             </a:fld>
             <a:endParaRPr lang="en-US"/>
           </a:p>
@@ -6262,7 +6347,7 @@
           <a:p>
             <a:fld id="{D753EFC8-4232-4598-94F6-94C0EBAFC469}" type="datetime1">
               <a:rPr lang="en-US" smtClean="0"/>
-              <a:t>1/10/21</a:t>
+              <a:t>6/15/21</a:t>
             </a:fld>
             <a:endParaRPr lang="en-US"/>
           </a:p>
@@ -6591,7 +6676,7 @@
           <a:p>
             <a:fld id="{F3161074-1C18-4AE7-957D-F18524378C85}" type="datetime1">
               <a:rPr lang="en-US" smtClean="0"/>
-              <a:t>1/10/21</a:t>
+              <a:t>6/15/21</a:t>
             </a:fld>
             <a:endParaRPr lang="en-US"/>
           </a:p>
@@ -6844,7 +6929,7 @@
           <a:p>
             <a:fld id="{69BE256C-8D9A-4404-B47D-41A1AE514425}" type="datetime1">
               <a:rPr lang="en-US" smtClean="0"/>
-              <a:t>1/10/21</a:t>
+              <a:t>6/15/21</a:t>
             </a:fld>
             <a:endParaRPr lang="en-US"/>
           </a:p>
@@ -7292,7 +7377,7 @@
           <a:p>
             <a:fld id="{66CB2154-9035-4012-8189-BAAB61C5A5EE}" type="datetime1">
               <a:rPr lang="en-US" smtClean="0"/>
-              <a:t>1/10/21</a:t>
+              <a:t>6/15/21</a:t>
             </a:fld>
             <a:endParaRPr lang="en-US"/>
           </a:p>
@@ -7480,7 +7565,7 @@
           <a:p>
             <a:fld id="{6700A58B-DD98-43D0-B791-721480A02982}" type="datetime1">
               <a:rPr lang="en-US" smtClean="0"/>
-              <a:t>1/10/21</a:t>
+              <a:t>6/15/21</a:t>
             </a:fld>
             <a:endParaRPr lang="en-US"/>
           </a:p>
@@ -7686,7 +7771,7 @@
           <a:p>
             <a:fld id="{7DB6E382-4F61-4E24-BE1A-377EC83D0E3A}" type="datetime1">
               <a:rPr lang="en-US" smtClean="0"/>
-              <a:t>1/10/21</a:t>
+              <a:t>6/15/21</a:t>
             </a:fld>
             <a:endParaRPr lang="en-US"/>
           </a:p>
@@ -8092,7 +8177,7 @@
           <a:p>
             <a:fld id="{4142EED6-FC16-45B9-B8C4-2BC5DBA88325}" type="datetime1">
               <a:rPr lang="en-US" smtClean="0"/>
-              <a:t>1/10/21</a:t>
+              <a:t>6/15/21</a:t>
             </a:fld>
             <a:endParaRPr lang="en-US"/>
           </a:p>
@@ -8424,7 +8509,7 @@
           <a:p>
             <a:fld id="{DF59512B-4F1D-43D7-8819-2F53FEF69650}" type="datetime1">
               <a:rPr lang="en-US" smtClean="0"/>
-              <a:t>1/10/21</a:t>
+              <a:t>6/15/21</a:t>
             </a:fld>
             <a:endParaRPr lang="en-US"/>
           </a:p>
@@ -8714,7 +8799,7 @@
           <a:p>
             <a:fld id="{08437B94-E2BF-44DC-ADC5-B05FC9934E9D}" type="datetime1">
               <a:rPr lang="en-US" smtClean="0"/>
-              <a:t>1/10/21</a:t>
+              <a:t>6/15/21</a:t>
             </a:fld>
             <a:endParaRPr lang="en-US"/>
           </a:p>
@@ -9487,7 +9572,7 @@
                 </a:spcAft>
                 <a:defRPr/>
               </a:pPr>
-              <a:t>1/10/21</a:t>
+              <a:t>6/15/21</a:t>
             </a:fld>
             <a:endParaRPr lang="en-US" sz="1000">
               <a:solidFill>
@@ -9667,7 +9752,7 @@
           <a:p>
             <a:fld id="{6700A58B-DD98-43D0-B791-721480A02982}" type="datetime1">
               <a:rPr lang="en-US" smtClean="0"/>
-              <a:t>1/10/21</a:t>
+              <a:t>6/15/21</a:t>
             </a:fld>
             <a:endParaRPr lang="en-US"/>
           </a:p>
@@ -9690,7 +9775,7 @@
           <a:p>
             <a:r>
               <a:rPr lang="en-US" dirty="0"/>
-              <a:t>In this exercise we will examine song lyrics</a:t>
+              <a:t>Tidy data uses %&gt;% to forward objects</a:t>
             </a:r>
           </a:p>
         </p:txBody>
@@ -9737,6 +9822,1097 @@
               <a:rPr lang="en-US" smtClean="0"/>
               <a:pPr/>
               <a:t>10</a:t>
+            </a:fld>
+            <a:endParaRPr lang="en-US" dirty="0"/>
+          </a:p>
+        </p:txBody>
+      </p:sp>
+      <p:sp>
+        <p:nvSpPr>
+          <p:cNvPr id="6" name="Rectangle 5">
+            <a:extLst>
+              <a:ext uri="{FF2B5EF4-FFF2-40B4-BE49-F238E27FC236}">
+                <a16:creationId xmlns:a16="http://schemas.microsoft.com/office/drawing/2014/main" id="{D940A206-84F1-4CFE-A274-27868154639E}"/>
+              </a:ext>
+            </a:extLst>
+          </p:cNvPr>
+          <p:cNvSpPr/>
+          <p:nvPr/>
+        </p:nvSpPr>
+        <p:spPr>
+          <a:xfrm>
+            <a:off x="93786" y="1486900"/>
+            <a:ext cx="8732162" cy="606943"/>
+          </a:xfrm>
+          <a:prstGeom prst="rect">
+            <a:avLst/>
+          </a:prstGeom>
+          <a:solidFill>
+            <a:schemeClr val="accent6"/>
+          </a:solidFill>
+          <a:ln>
+            <a:noFill/>
+          </a:ln>
+          <a:effectLst/>
+        </p:spPr>
+        <p:style>
+          <a:lnRef idx="1">
+            <a:schemeClr val="accent1"/>
+          </a:lnRef>
+          <a:fillRef idx="3">
+            <a:schemeClr val="accent1"/>
+          </a:fillRef>
+          <a:effectRef idx="2">
+            <a:schemeClr val="accent1"/>
+          </a:effectRef>
+          <a:fontRef idx="minor">
+            <a:schemeClr val="lt1"/>
+          </a:fontRef>
+        </p:style>
+        <p:txBody>
+          <a:bodyPr rtlCol="0" anchor="ctr"/>
+          <a:lstStyle/>
+          <a:p>
+            <a:pPr algn="ctr"/>
+            <a:r>
+              <a:rPr lang="en-US" sz="1600" dirty="0"/>
+              <a:t>In the “</a:t>
+            </a:r>
+            <a:r>
+              <a:rPr lang="en-US" sz="1600" dirty="0" err="1"/>
+              <a:t>tidyverse</a:t>
+            </a:r>
+            <a:r>
+              <a:rPr lang="en-US" sz="1600" dirty="0"/>
+              <a:t>” code is structured so it is more easily read using the %&gt;%.   The data format is a </a:t>
+            </a:r>
+            <a:r>
+              <a:rPr lang="en-US" sz="1600" dirty="0" err="1"/>
+              <a:t>tibble</a:t>
+            </a:r>
+            <a:r>
+              <a:rPr lang="en-US" sz="1600" dirty="0"/>
+              <a:t> usually not a data frame.</a:t>
+            </a:r>
+          </a:p>
+        </p:txBody>
+      </p:sp>
+      <p:sp>
+        <p:nvSpPr>
+          <p:cNvPr id="7" name="Rectangle 1">
+            <a:extLst>
+              <a:ext uri="{FF2B5EF4-FFF2-40B4-BE49-F238E27FC236}">
+                <a16:creationId xmlns:a16="http://schemas.microsoft.com/office/drawing/2014/main" id="{39FFFAF3-C96C-462B-B199-570A86DECD12}"/>
+              </a:ext>
+            </a:extLst>
+          </p:cNvPr>
+          <p:cNvSpPr>
+            <a:spLocks noChangeArrowheads="1"/>
+          </p:cNvSpPr>
+          <p:nvPr/>
+        </p:nvSpPr>
+        <p:spPr bwMode="auto">
+          <a:xfrm>
+            <a:off x="83656" y="2373204"/>
+            <a:ext cx="857927" cy="338554"/>
+          </a:xfrm>
+          <a:prstGeom prst="rect">
+            <a:avLst/>
+          </a:prstGeom>
+          <a:solidFill>
+            <a:schemeClr val="bg1">
+              <a:lumMod val="85000"/>
+            </a:schemeClr>
+          </a:solidFill>
+          <a:ln>
+            <a:noFill/>
+          </a:ln>
+          <a:effectLst/>
+        </p:spPr>
+        <p:txBody>
+          <a:bodyPr vert="horz" wrap="none" lIns="91440" tIns="45720" rIns="91440" bIns="45720" numCol="1" anchor="ctr" anchorCtr="0" compatLnSpc="1">
+            <a:prstTxWarp prst="textNoShape">
+              <a:avLst/>
+            </a:prstTxWarp>
+            <a:spAutoFit/>
+          </a:bodyPr>
+          <a:lstStyle/>
+          <a:p>
+            <a:pPr marL="0" marR="0" lvl="0" indent="0" algn="l" defTabSz="914400" rtl="0" eaLnBrk="0" fontAlgn="base" latinLnBrk="0" hangingPunct="0">
+              <a:lnSpc>
+                <a:spcPct val="100000"/>
+              </a:lnSpc>
+              <a:spcBef>
+                <a:spcPct val="0"/>
+              </a:spcBef>
+              <a:spcAft>
+                <a:spcPct val="0"/>
+              </a:spcAft>
+              <a:buClrTx/>
+              <a:buSzTx/>
+              <a:buFontTx/>
+              <a:buNone/>
+              <a:tabLst/>
+            </a:pPr>
+            <a:r>
+              <a:rPr kumimoji="0" lang="en-US" altLang="en-US" sz="1600" b="0" i="0" u="none" strike="noStrike" cap="none" normalizeH="0" baseline="0" dirty="0" err="1">
+                <a:ln>
+                  <a:noFill/>
+                </a:ln>
+                <a:solidFill>
+                  <a:srgbClr val="000000"/>
+                </a:solidFill>
+                <a:effectLst/>
+                <a:latin typeface="Consolas" panose="020B0609020204030204" pitchFamily="49" charset="0"/>
+                <a:cs typeface="Consolas" panose="020B0609020204030204" pitchFamily="49" charset="0"/>
+              </a:rPr>
+              <a:t>mtcars</a:t>
+            </a:r>
+            <a:endParaRPr kumimoji="0" lang="en-US" altLang="en-US" sz="3200" b="0" i="0" u="none" strike="noStrike" cap="none" normalizeH="0" baseline="0" dirty="0">
+              <a:ln>
+                <a:noFill/>
+              </a:ln>
+              <a:solidFill>
+                <a:schemeClr val="tx1"/>
+              </a:solidFill>
+              <a:effectLst/>
+              <a:latin typeface="Consolas" panose="020B0609020204030204" pitchFamily="49" charset="0"/>
+              <a:cs typeface="Consolas" panose="020B0609020204030204" pitchFamily="49" charset="0"/>
+            </a:endParaRPr>
+          </a:p>
+        </p:txBody>
+      </p:sp>
+      <p:sp>
+        <p:nvSpPr>
+          <p:cNvPr id="8" name="TextBox 7">
+            <a:extLst>
+              <a:ext uri="{FF2B5EF4-FFF2-40B4-BE49-F238E27FC236}">
+                <a16:creationId xmlns:a16="http://schemas.microsoft.com/office/drawing/2014/main" id="{58D0FEC3-CC7F-4699-A9B3-61C9844AF549}"/>
+              </a:ext>
+            </a:extLst>
+          </p:cNvPr>
+          <p:cNvSpPr txBox="1"/>
+          <p:nvPr/>
+        </p:nvSpPr>
+        <p:spPr>
+          <a:xfrm>
+            <a:off x="93786" y="4287177"/>
+            <a:ext cx="8732162" cy="404092"/>
+          </a:xfrm>
+          <a:prstGeom prst="rect">
+            <a:avLst/>
+          </a:prstGeom>
+          <a:solidFill>
+            <a:schemeClr val="accent6"/>
+          </a:solidFill>
+          <a:ln>
+            <a:noFill/>
+          </a:ln>
+          <a:effectLst/>
+        </p:spPr>
+        <p:style>
+          <a:lnRef idx="1">
+            <a:schemeClr val="accent1"/>
+          </a:lnRef>
+          <a:fillRef idx="3">
+            <a:schemeClr val="accent1"/>
+          </a:fillRef>
+          <a:effectRef idx="2">
+            <a:schemeClr val="accent1"/>
+          </a:effectRef>
+          <a:fontRef idx="minor">
+            <a:schemeClr val="lt1"/>
+          </a:fontRef>
+        </p:style>
+        <p:txBody>
+          <a:bodyPr rot="0" spcFirstLastPara="0" vertOverflow="overflow" horzOverflow="overflow" vert="horz" wrap="square" lIns="91440" tIns="45720" rIns="91440" bIns="45720" numCol="1" spcCol="0" rtlCol="0" fromWordArt="0" anchor="ctr" anchorCtr="0" forceAA="0" compatLnSpc="1">
+            <a:prstTxWarp prst="textNoShape">
+              <a:avLst/>
+            </a:prstTxWarp>
+            <a:noAutofit/>
+          </a:bodyPr>
+          <a:lstStyle>
+            <a:defPPr marR="0" lvl="0" algn="l" rtl="0">
+              <a:lnSpc>
+                <a:spcPct val="100000"/>
+              </a:lnSpc>
+              <a:spcBef>
+                <a:spcPts val="0"/>
+              </a:spcBef>
+              <a:spcAft>
+                <a:spcPts val="0"/>
+              </a:spcAft>
+            </a:defPPr>
+            <a:lvl1pPr algn="ctr">
+              <a:defRPr>
+                <a:solidFill>
+                  <a:schemeClr val="lt1"/>
+                </a:solidFill>
+                <a:latin typeface="+mn-lt"/>
+                <a:ea typeface="+mn-ea"/>
+                <a:cs typeface="+mn-cs"/>
+              </a:defRPr>
+            </a:lvl1pPr>
+            <a:lvl2pPr>
+              <a:defRPr>
+                <a:solidFill>
+                  <a:schemeClr val="lt1"/>
+                </a:solidFill>
+                <a:latin typeface="+mn-lt"/>
+                <a:ea typeface="+mn-ea"/>
+                <a:cs typeface="+mn-cs"/>
+              </a:defRPr>
+            </a:lvl2pPr>
+            <a:lvl3pPr>
+              <a:defRPr>
+                <a:solidFill>
+                  <a:schemeClr val="lt1"/>
+                </a:solidFill>
+                <a:latin typeface="+mn-lt"/>
+                <a:ea typeface="+mn-ea"/>
+                <a:cs typeface="+mn-cs"/>
+              </a:defRPr>
+            </a:lvl3pPr>
+            <a:lvl4pPr>
+              <a:defRPr>
+                <a:solidFill>
+                  <a:schemeClr val="lt1"/>
+                </a:solidFill>
+                <a:latin typeface="+mn-lt"/>
+                <a:ea typeface="+mn-ea"/>
+                <a:cs typeface="+mn-cs"/>
+              </a:defRPr>
+            </a:lvl4pPr>
+            <a:lvl5pPr>
+              <a:defRPr>
+                <a:solidFill>
+                  <a:schemeClr val="lt1"/>
+                </a:solidFill>
+                <a:latin typeface="+mn-lt"/>
+                <a:ea typeface="+mn-ea"/>
+                <a:cs typeface="+mn-cs"/>
+              </a:defRPr>
+            </a:lvl5pPr>
+            <a:lvl6pPr>
+              <a:defRPr>
+                <a:solidFill>
+                  <a:schemeClr val="lt1"/>
+                </a:solidFill>
+                <a:latin typeface="+mn-lt"/>
+                <a:ea typeface="+mn-ea"/>
+                <a:cs typeface="+mn-cs"/>
+              </a:defRPr>
+            </a:lvl6pPr>
+            <a:lvl7pPr>
+              <a:defRPr>
+                <a:solidFill>
+                  <a:schemeClr val="lt1"/>
+                </a:solidFill>
+                <a:latin typeface="+mn-lt"/>
+                <a:ea typeface="+mn-ea"/>
+                <a:cs typeface="+mn-cs"/>
+              </a:defRPr>
+            </a:lvl7pPr>
+            <a:lvl8pPr>
+              <a:defRPr>
+                <a:solidFill>
+                  <a:schemeClr val="lt1"/>
+                </a:solidFill>
+                <a:latin typeface="+mn-lt"/>
+                <a:ea typeface="+mn-ea"/>
+                <a:cs typeface="+mn-cs"/>
+              </a:defRPr>
+            </a:lvl8pPr>
+            <a:lvl9pPr>
+              <a:defRPr>
+                <a:solidFill>
+                  <a:schemeClr val="lt1"/>
+                </a:solidFill>
+                <a:latin typeface="+mn-lt"/>
+                <a:ea typeface="+mn-ea"/>
+                <a:cs typeface="+mn-cs"/>
+              </a:defRPr>
+            </a:lvl9pPr>
+          </a:lstStyle>
+          <a:p>
+            <a:r>
+              <a:rPr lang="en-US" sz="1400" dirty="0"/>
+              <a:t>This reads as “Using the </a:t>
+            </a:r>
+            <a:r>
+              <a:rPr lang="en-US" sz="1400" dirty="0" err="1"/>
+              <a:t>mtcars</a:t>
+            </a:r>
+            <a:r>
+              <a:rPr lang="en-US" sz="1400" dirty="0"/>
+              <a:t> object </a:t>
+            </a:r>
+            <a:r>
+              <a:rPr lang="en-US" sz="1400" i="1" dirty="0"/>
+              <a:t>then</a:t>
+            </a:r>
+            <a:r>
+              <a:rPr lang="en-US" sz="1400" dirty="0"/>
+              <a:t> group by the </a:t>
+            </a:r>
+            <a:r>
+              <a:rPr lang="en-US" sz="1400" dirty="0" err="1"/>
+              <a:t>cyl</a:t>
+            </a:r>
+            <a:r>
+              <a:rPr lang="en-US" sz="1400" dirty="0"/>
+              <a:t> vector </a:t>
+            </a:r>
+            <a:r>
+              <a:rPr lang="en-US" sz="1400" i="1" dirty="0"/>
+              <a:t>then</a:t>
+            </a:r>
+            <a:r>
+              <a:rPr lang="en-US" sz="1400" dirty="0"/>
+              <a:t> mutate a new variable called rank.</a:t>
+            </a:r>
+          </a:p>
+        </p:txBody>
+      </p:sp>
+      <p:sp>
+        <p:nvSpPr>
+          <p:cNvPr id="9" name="Rectangle 1">
+            <a:extLst>
+              <a:ext uri="{FF2B5EF4-FFF2-40B4-BE49-F238E27FC236}">
+                <a16:creationId xmlns:a16="http://schemas.microsoft.com/office/drawing/2014/main" id="{CF8A6302-CAB8-124A-955D-B4D0F625DF0E}"/>
+              </a:ext>
+            </a:extLst>
+          </p:cNvPr>
+          <p:cNvSpPr>
+            <a:spLocks noChangeArrowheads="1"/>
+          </p:cNvSpPr>
+          <p:nvPr/>
+        </p:nvSpPr>
+        <p:spPr bwMode="auto">
+          <a:xfrm>
+            <a:off x="83656" y="2784021"/>
+            <a:ext cx="2877711" cy="338554"/>
+          </a:xfrm>
+          <a:prstGeom prst="rect">
+            <a:avLst/>
+          </a:prstGeom>
+          <a:solidFill>
+            <a:schemeClr val="bg1">
+              <a:lumMod val="85000"/>
+            </a:schemeClr>
+          </a:solidFill>
+          <a:ln>
+            <a:noFill/>
+          </a:ln>
+          <a:effectLst/>
+        </p:spPr>
+        <p:txBody>
+          <a:bodyPr vert="horz" wrap="none" lIns="91440" tIns="45720" rIns="91440" bIns="45720" numCol="1" anchor="ctr" anchorCtr="0" compatLnSpc="1">
+            <a:prstTxWarp prst="textNoShape">
+              <a:avLst/>
+            </a:prstTxWarp>
+            <a:spAutoFit/>
+          </a:bodyPr>
+          <a:lstStyle/>
+          <a:p>
+            <a:pPr marL="0" marR="0" lvl="0" indent="0" algn="l" defTabSz="914400" rtl="0" eaLnBrk="0" fontAlgn="base" latinLnBrk="0" hangingPunct="0">
+              <a:lnSpc>
+                <a:spcPct val="100000"/>
+              </a:lnSpc>
+              <a:spcBef>
+                <a:spcPct val="0"/>
+              </a:spcBef>
+              <a:spcAft>
+                <a:spcPct val="0"/>
+              </a:spcAft>
+              <a:buClrTx/>
+              <a:buSzTx/>
+              <a:buFontTx/>
+              <a:buNone/>
+              <a:tabLst/>
+            </a:pPr>
+            <a:r>
+              <a:rPr kumimoji="0" lang="en-US" altLang="en-US" sz="1600" b="0" i="0" u="none" strike="noStrike" cap="none" normalizeH="0" baseline="0" dirty="0" err="1">
+                <a:ln>
+                  <a:noFill/>
+                </a:ln>
+                <a:solidFill>
+                  <a:srgbClr val="000000"/>
+                </a:solidFill>
+                <a:effectLst/>
+                <a:latin typeface="Consolas" panose="020B0609020204030204" pitchFamily="49" charset="0"/>
+                <a:cs typeface="Consolas" panose="020B0609020204030204" pitchFamily="49" charset="0"/>
+              </a:rPr>
+              <a:t>mtcars</a:t>
+            </a:r>
+            <a:r>
+              <a:rPr kumimoji="0" lang="en-US" altLang="en-US" sz="1600" b="0" i="0" u="none" strike="noStrike" cap="none" normalizeH="0" baseline="0" dirty="0">
+                <a:ln>
+                  <a:noFill/>
+                </a:ln>
+                <a:solidFill>
+                  <a:srgbClr val="000000"/>
+                </a:solidFill>
+                <a:effectLst/>
+                <a:latin typeface="Consolas" panose="020B0609020204030204" pitchFamily="49" charset="0"/>
+                <a:cs typeface="Consolas" panose="020B0609020204030204" pitchFamily="49" charset="0"/>
+              </a:rPr>
+              <a:t> %&gt;% </a:t>
+            </a:r>
+            <a:r>
+              <a:rPr kumimoji="0" lang="en-US" altLang="en-US" sz="1600" b="0" i="0" u="none" strike="noStrike" cap="none" normalizeH="0" baseline="0" dirty="0" err="1">
+                <a:ln>
+                  <a:noFill/>
+                </a:ln>
+                <a:solidFill>
+                  <a:srgbClr val="000000"/>
+                </a:solidFill>
+                <a:effectLst/>
+                <a:latin typeface="Consolas" panose="020B0609020204030204" pitchFamily="49" charset="0"/>
+                <a:cs typeface="Consolas" panose="020B0609020204030204" pitchFamily="49" charset="0"/>
+              </a:rPr>
+              <a:t>group_by</a:t>
+            </a:r>
+            <a:r>
+              <a:rPr kumimoji="0" lang="en-US" altLang="en-US" sz="1600" b="0" i="0" u="none" strike="noStrike" cap="none" normalizeH="0" baseline="0" dirty="0">
+                <a:ln>
+                  <a:noFill/>
+                </a:ln>
+                <a:solidFill>
+                  <a:srgbClr val="000000"/>
+                </a:solidFill>
+                <a:effectLst/>
+                <a:latin typeface="Consolas" panose="020B0609020204030204" pitchFamily="49" charset="0"/>
+                <a:cs typeface="Consolas" panose="020B0609020204030204" pitchFamily="49" charset="0"/>
+              </a:rPr>
+              <a:t>(</a:t>
+            </a:r>
+            <a:r>
+              <a:rPr kumimoji="0" lang="en-US" altLang="en-US" sz="1600" b="0" i="0" u="none" strike="noStrike" cap="none" normalizeH="0" baseline="0" dirty="0" err="1">
+                <a:ln>
+                  <a:noFill/>
+                </a:ln>
+                <a:solidFill>
+                  <a:srgbClr val="000000"/>
+                </a:solidFill>
+                <a:effectLst/>
+                <a:latin typeface="Consolas" panose="020B0609020204030204" pitchFamily="49" charset="0"/>
+                <a:cs typeface="Consolas" panose="020B0609020204030204" pitchFamily="49" charset="0"/>
+              </a:rPr>
+              <a:t>cyl</a:t>
+            </a:r>
+            <a:r>
+              <a:rPr kumimoji="0" lang="en-US" altLang="en-US" sz="1600" b="0" i="0" u="none" strike="noStrike" cap="none" normalizeH="0" baseline="0" dirty="0">
+                <a:ln>
+                  <a:noFill/>
+                </a:ln>
+                <a:solidFill>
+                  <a:srgbClr val="000000"/>
+                </a:solidFill>
+                <a:effectLst/>
+                <a:latin typeface="Consolas" panose="020B0609020204030204" pitchFamily="49" charset="0"/>
+                <a:cs typeface="Consolas" panose="020B0609020204030204" pitchFamily="49" charset="0"/>
+              </a:rPr>
+              <a:t>)</a:t>
+            </a:r>
+            <a:endParaRPr kumimoji="0" lang="en-US" altLang="en-US" sz="3200" b="0" i="0" u="none" strike="noStrike" cap="none" normalizeH="0" baseline="0" dirty="0">
+              <a:ln>
+                <a:noFill/>
+              </a:ln>
+              <a:solidFill>
+                <a:schemeClr val="tx1"/>
+              </a:solidFill>
+              <a:effectLst/>
+              <a:latin typeface="Consolas" panose="020B0609020204030204" pitchFamily="49" charset="0"/>
+              <a:cs typeface="Consolas" panose="020B0609020204030204" pitchFamily="49" charset="0"/>
+            </a:endParaRPr>
+          </a:p>
+        </p:txBody>
+      </p:sp>
+      <p:sp>
+        <p:nvSpPr>
+          <p:cNvPr id="10" name="Rectangle 1">
+            <a:extLst>
+              <a:ext uri="{FF2B5EF4-FFF2-40B4-BE49-F238E27FC236}">
+                <a16:creationId xmlns:a16="http://schemas.microsoft.com/office/drawing/2014/main" id="{07D57D57-56CA-7F4C-84C6-D92D128A29ED}"/>
+              </a:ext>
+            </a:extLst>
+          </p:cNvPr>
+          <p:cNvSpPr>
+            <a:spLocks noChangeArrowheads="1"/>
+          </p:cNvSpPr>
+          <p:nvPr/>
+        </p:nvSpPr>
+        <p:spPr bwMode="auto">
+          <a:xfrm>
+            <a:off x="83656" y="3210227"/>
+            <a:ext cx="6445995" cy="307777"/>
+          </a:xfrm>
+          <a:prstGeom prst="rect">
+            <a:avLst/>
+          </a:prstGeom>
+          <a:solidFill>
+            <a:schemeClr val="bg1">
+              <a:lumMod val="85000"/>
+            </a:schemeClr>
+          </a:solidFill>
+          <a:ln>
+            <a:noFill/>
+          </a:ln>
+          <a:effectLst/>
+        </p:spPr>
+        <p:txBody>
+          <a:bodyPr vert="horz" wrap="none" lIns="91440" tIns="45720" rIns="91440" bIns="45720" numCol="1" anchor="ctr" anchorCtr="0" compatLnSpc="1">
+            <a:prstTxWarp prst="textNoShape">
+              <a:avLst/>
+            </a:prstTxWarp>
+            <a:spAutoFit/>
+          </a:bodyPr>
+          <a:lstStyle/>
+          <a:p>
+            <a:pPr marL="0" marR="0" lvl="0" indent="0" algn="l" defTabSz="914400" rtl="0" eaLnBrk="0" fontAlgn="base" latinLnBrk="0" hangingPunct="0">
+              <a:lnSpc>
+                <a:spcPct val="100000"/>
+              </a:lnSpc>
+              <a:spcBef>
+                <a:spcPct val="0"/>
+              </a:spcBef>
+              <a:spcAft>
+                <a:spcPct val="0"/>
+              </a:spcAft>
+              <a:buClrTx/>
+              <a:buSzTx/>
+              <a:buFontTx/>
+              <a:buNone/>
+              <a:tabLst/>
+            </a:pPr>
+            <a:r>
+              <a:rPr kumimoji="0" lang="en-US" altLang="en-US" sz="1400" b="0" i="0" u="none" strike="noStrike" cap="none" normalizeH="0" baseline="0" dirty="0" err="1">
+                <a:ln>
+                  <a:noFill/>
+                </a:ln>
+                <a:solidFill>
+                  <a:srgbClr val="000000"/>
+                </a:solidFill>
+                <a:effectLst/>
+                <a:latin typeface="Consolas" panose="020B0609020204030204" pitchFamily="49" charset="0"/>
+                <a:cs typeface="Consolas" panose="020B0609020204030204" pitchFamily="49" charset="0"/>
+              </a:rPr>
+              <a:t>mtcars</a:t>
+            </a:r>
+            <a:r>
+              <a:rPr kumimoji="0" lang="en-US" altLang="en-US" sz="1400" b="0" i="0" u="none" strike="noStrike" cap="none" normalizeH="0" baseline="0" dirty="0">
+                <a:ln>
+                  <a:noFill/>
+                </a:ln>
+                <a:solidFill>
+                  <a:srgbClr val="000000"/>
+                </a:solidFill>
+                <a:effectLst/>
+                <a:latin typeface="Consolas" panose="020B0609020204030204" pitchFamily="49" charset="0"/>
+                <a:cs typeface="Consolas" panose="020B0609020204030204" pitchFamily="49" charset="0"/>
+              </a:rPr>
+              <a:t> %&gt;% </a:t>
+            </a:r>
+            <a:r>
+              <a:rPr kumimoji="0" lang="en-US" altLang="en-US" sz="1400" b="0" i="0" u="none" strike="noStrike" cap="none" normalizeH="0" baseline="0" dirty="0" err="1">
+                <a:ln>
+                  <a:noFill/>
+                </a:ln>
+                <a:solidFill>
+                  <a:srgbClr val="000000"/>
+                </a:solidFill>
+                <a:effectLst/>
+                <a:latin typeface="Consolas" panose="020B0609020204030204" pitchFamily="49" charset="0"/>
+                <a:cs typeface="Consolas" panose="020B0609020204030204" pitchFamily="49" charset="0"/>
+              </a:rPr>
+              <a:t>group_by</a:t>
+            </a:r>
+            <a:r>
+              <a:rPr kumimoji="0" lang="en-US" altLang="en-US" sz="1400" b="0" i="0" u="none" strike="noStrike" cap="none" normalizeH="0" baseline="0" dirty="0">
+                <a:ln>
+                  <a:noFill/>
+                </a:ln>
+                <a:solidFill>
+                  <a:srgbClr val="000000"/>
+                </a:solidFill>
+                <a:effectLst/>
+                <a:latin typeface="Consolas" panose="020B0609020204030204" pitchFamily="49" charset="0"/>
+                <a:cs typeface="Consolas" panose="020B0609020204030204" pitchFamily="49" charset="0"/>
+              </a:rPr>
+              <a:t>(</a:t>
+            </a:r>
+            <a:r>
+              <a:rPr kumimoji="0" lang="en-US" altLang="en-US" sz="1400" b="0" i="0" u="none" strike="noStrike" cap="none" normalizeH="0" baseline="0" dirty="0" err="1">
+                <a:ln>
+                  <a:noFill/>
+                </a:ln>
+                <a:solidFill>
+                  <a:srgbClr val="000000"/>
+                </a:solidFill>
+                <a:effectLst/>
+                <a:latin typeface="Consolas" panose="020B0609020204030204" pitchFamily="49" charset="0"/>
+                <a:cs typeface="Consolas" panose="020B0609020204030204" pitchFamily="49" charset="0"/>
+              </a:rPr>
+              <a:t>cyl</a:t>
+            </a:r>
+            <a:r>
+              <a:rPr kumimoji="0" lang="en-US" altLang="en-US" sz="1400" b="0" i="0" u="none" strike="noStrike" cap="none" normalizeH="0" baseline="0" dirty="0">
+                <a:ln>
+                  <a:noFill/>
+                </a:ln>
+                <a:solidFill>
+                  <a:srgbClr val="000000"/>
+                </a:solidFill>
+                <a:effectLst/>
+                <a:latin typeface="Consolas" panose="020B0609020204030204" pitchFamily="49" charset="0"/>
+                <a:cs typeface="Consolas" panose="020B0609020204030204" pitchFamily="49" charset="0"/>
+              </a:rPr>
+              <a:t>) %&gt;% mutate(rank = </a:t>
+            </a:r>
+            <a:r>
+              <a:rPr kumimoji="0" lang="en-US" altLang="en-US" sz="1400" b="0" i="0" u="none" strike="noStrike" cap="none" normalizeH="0" baseline="0" dirty="0" err="1">
+                <a:ln>
+                  <a:noFill/>
+                </a:ln>
+                <a:solidFill>
+                  <a:srgbClr val="000000"/>
+                </a:solidFill>
+                <a:effectLst/>
+                <a:latin typeface="Consolas" panose="020B0609020204030204" pitchFamily="49" charset="0"/>
+                <a:cs typeface="Consolas" panose="020B0609020204030204" pitchFamily="49" charset="0"/>
+              </a:rPr>
+              <a:t>min_rank</a:t>
+            </a:r>
+            <a:r>
+              <a:rPr kumimoji="0" lang="en-US" altLang="en-US" sz="1400" b="0" i="0" u="none" strike="noStrike" cap="none" normalizeH="0" baseline="0" dirty="0">
+                <a:ln>
+                  <a:noFill/>
+                </a:ln>
+                <a:solidFill>
+                  <a:srgbClr val="000000"/>
+                </a:solidFill>
+                <a:effectLst/>
+                <a:latin typeface="Consolas" panose="020B0609020204030204" pitchFamily="49" charset="0"/>
+                <a:cs typeface="Consolas" panose="020B0609020204030204" pitchFamily="49" charset="0"/>
+              </a:rPr>
+              <a:t>(desc(mpg)))</a:t>
+            </a:r>
+            <a:endParaRPr kumimoji="0" lang="en-US" altLang="en-US" sz="2800" b="0" i="0" u="none" strike="noStrike" cap="none" normalizeH="0" baseline="0" dirty="0">
+              <a:ln>
+                <a:noFill/>
+              </a:ln>
+              <a:solidFill>
+                <a:schemeClr val="tx1"/>
+              </a:solidFill>
+              <a:effectLst/>
+              <a:latin typeface="Consolas" panose="020B0609020204030204" pitchFamily="49" charset="0"/>
+              <a:cs typeface="Consolas" panose="020B0609020204030204" pitchFamily="49" charset="0"/>
+            </a:endParaRPr>
+          </a:p>
+        </p:txBody>
+      </p:sp>
+      <p:cxnSp>
+        <p:nvCxnSpPr>
+          <p:cNvPr id="14" name="Straight Connector 13">
+            <a:extLst>
+              <a:ext uri="{FF2B5EF4-FFF2-40B4-BE49-F238E27FC236}">
+                <a16:creationId xmlns:a16="http://schemas.microsoft.com/office/drawing/2014/main" id="{8BAC59A9-F984-CB46-92E7-894ED2476187}"/>
+              </a:ext>
+            </a:extLst>
+          </p:cNvPr>
+          <p:cNvCxnSpPr/>
+          <p:nvPr/>
+        </p:nvCxnSpPr>
+        <p:spPr>
+          <a:xfrm>
+            <a:off x="6798363" y="6549885"/>
+            <a:ext cx="0" cy="182880"/>
+          </a:xfrm>
+          <a:prstGeom prst="line">
+            <a:avLst/>
+          </a:prstGeom>
+          <a:ln>
+            <a:solidFill>
+              <a:schemeClr val="bg1">
+                <a:lumMod val="85000"/>
+              </a:schemeClr>
+            </a:solidFill>
+          </a:ln>
+        </p:spPr>
+        <p:style>
+          <a:lnRef idx="1">
+            <a:schemeClr val="accent1"/>
+          </a:lnRef>
+          <a:fillRef idx="0">
+            <a:schemeClr val="accent1"/>
+          </a:fillRef>
+          <a:effectRef idx="0">
+            <a:schemeClr val="accent1"/>
+          </a:effectRef>
+          <a:fontRef idx="minor">
+            <a:schemeClr val="tx1"/>
+          </a:fontRef>
+        </p:style>
+      </p:cxnSp>
+      <p:cxnSp>
+        <p:nvCxnSpPr>
+          <p:cNvPr id="15" name="Straight Connector 14">
+            <a:extLst>
+              <a:ext uri="{FF2B5EF4-FFF2-40B4-BE49-F238E27FC236}">
+                <a16:creationId xmlns:a16="http://schemas.microsoft.com/office/drawing/2014/main" id="{85BF6A31-01F7-434F-A98A-1D421D75C4AA}"/>
+              </a:ext>
+            </a:extLst>
+          </p:cNvPr>
+          <p:cNvCxnSpPr/>
+          <p:nvPr/>
+        </p:nvCxnSpPr>
+        <p:spPr>
+          <a:xfrm>
+            <a:off x="7076661" y="4664763"/>
+            <a:ext cx="182880" cy="0"/>
+          </a:xfrm>
+          <a:prstGeom prst="line">
+            <a:avLst/>
+          </a:prstGeom>
+          <a:ln>
+            <a:solidFill>
+              <a:schemeClr val="bg1">
+                <a:lumMod val="85000"/>
+              </a:schemeClr>
+            </a:solidFill>
+          </a:ln>
+        </p:spPr>
+        <p:style>
+          <a:lnRef idx="1">
+            <a:schemeClr val="accent1"/>
+          </a:lnRef>
+          <a:fillRef idx="0">
+            <a:schemeClr val="accent1"/>
+          </a:fillRef>
+          <a:effectRef idx="0">
+            <a:schemeClr val="accent1"/>
+          </a:effectRef>
+          <a:fontRef idx="minor">
+            <a:schemeClr val="tx1"/>
+          </a:fontRef>
+        </p:style>
+      </p:cxnSp>
+    </p:spTree>
+    <p:extLst>
+      <p:ext uri="{BB962C8B-B14F-4D97-AF65-F5344CB8AC3E}">
+        <p14:creationId xmlns:p14="http://schemas.microsoft.com/office/powerpoint/2010/main" val="1819628604"/>
+      </p:ext>
+    </p:extLst>
+  </p:cSld>
+  <p:clrMapOvr>
+    <a:masterClrMapping/>
+  </p:clrMapOvr>
+  <p:timing>
+    <p:tnLst>
+      <p:par>
+        <p:cTn id="1" dur="indefinite" restart="never" nodeType="tmRoot">
+          <p:childTnLst>
+            <p:seq concurrent="1" nextAc="seek">
+              <p:cTn id="2" dur="indefinite" nodeType="mainSeq">
+                <p:childTnLst>
+                  <p:par>
+                    <p:cTn id="3" fill="hold">
+                      <p:stCondLst>
+                        <p:cond delay="indefinite"/>
+                      </p:stCondLst>
+                      <p:childTnLst>
+                        <p:par>
+                          <p:cTn id="4" fill="hold">
+                            <p:stCondLst>
+                              <p:cond delay="0"/>
+                            </p:stCondLst>
+                            <p:childTnLst>
+                              <p:par>
+                                <p:cTn id="5" presetID="1" presetClass="entr" presetSubtype="0" fill="hold" grpId="0" nodeType="clickEffect">
+                                  <p:stCondLst>
+                                    <p:cond delay="0"/>
+                                  </p:stCondLst>
+                                  <p:childTnLst>
+                                    <p:set>
+                                      <p:cBhvr>
+                                        <p:cTn id="6" dur="1" fill="hold">
+                                          <p:stCondLst>
+                                            <p:cond delay="0"/>
+                                          </p:stCondLst>
+                                        </p:cTn>
+                                        <p:tgtEl>
+                                          <p:spTgt spid="7"/>
+                                        </p:tgtEl>
+                                        <p:attrNameLst>
+                                          <p:attrName>style.visibility</p:attrName>
+                                        </p:attrNameLst>
+                                      </p:cBhvr>
+                                      <p:to>
+                                        <p:strVal val="visible"/>
+                                      </p:to>
+                                    </p:set>
+                                  </p:childTnLst>
+                                </p:cTn>
+                              </p:par>
+                            </p:childTnLst>
+                          </p:cTn>
+                        </p:par>
+                      </p:childTnLst>
+                    </p:cTn>
+                  </p:par>
+                  <p:par>
+                    <p:cTn id="7" fill="hold">
+                      <p:stCondLst>
+                        <p:cond delay="indefinite"/>
+                      </p:stCondLst>
+                      <p:childTnLst>
+                        <p:par>
+                          <p:cTn id="8" fill="hold">
+                            <p:stCondLst>
+                              <p:cond delay="0"/>
+                            </p:stCondLst>
+                            <p:childTnLst>
+                              <p:par>
+                                <p:cTn id="9" presetID="1" presetClass="entr" presetSubtype="0" fill="hold" grpId="0" nodeType="clickEffect">
+                                  <p:stCondLst>
+                                    <p:cond delay="0"/>
+                                  </p:stCondLst>
+                                  <p:childTnLst>
+                                    <p:set>
+                                      <p:cBhvr>
+                                        <p:cTn id="10" dur="1" fill="hold">
+                                          <p:stCondLst>
+                                            <p:cond delay="0"/>
+                                          </p:stCondLst>
+                                        </p:cTn>
+                                        <p:tgtEl>
+                                          <p:spTgt spid="9"/>
+                                        </p:tgtEl>
+                                        <p:attrNameLst>
+                                          <p:attrName>style.visibility</p:attrName>
+                                        </p:attrNameLst>
+                                      </p:cBhvr>
+                                      <p:to>
+                                        <p:strVal val="visible"/>
+                                      </p:to>
+                                    </p:set>
+                                  </p:childTnLst>
+                                </p:cTn>
+                              </p:par>
+                            </p:childTnLst>
+                          </p:cTn>
+                        </p:par>
+                      </p:childTnLst>
+                    </p:cTn>
+                  </p:par>
+                  <p:par>
+                    <p:cTn id="11" fill="hold">
+                      <p:stCondLst>
+                        <p:cond delay="indefinite"/>
+                      </p:stCondLst>
+                      <p:childTnLst>
+                        <p:par>
+                          <p:cTn id="12" fill="hold">
+                            <p:stCondLst>
+                              <p:cond delay="0"/>
+                            </p:stCondLst>
+                            <p:childTnLst>
+                              <p:par>
+                                <p:cTn id="13" presetID="1" presetClass="entr" presetSubtype="0" fill="hold" grpId="0" nodeType="clickEffect">
+                                  <p:stCondLst>
+                                    <p:cond delay="0"/>
+                                  </p:stCondLst>
+                                  <p:childTnLst>
+                                    <p:set>
+                                      <p:cBhvr>
+                                        <p:cTn id="14" dur="1" fill="hold">
+                                          <p:stCondLst>
+                                            <p:cond delay="0"/>
+                                          </p:stCondLst>
+                                        </p:cTn>
+                                        <p:tgtEl>
+                                          <p:spTgt spid="10"/>
+                                        </p:tgtEl>
+                                        <p:attrNameLst>
+                                          <p:attrName>style.visibility</p:attrName>
+                                        </p:attrNameLst>
+                                      </p:cBhvr>
+                                      <p:to>
+                                        <p:strVal val="visible"/>
+                                      </p:to>
+                                    </p:set>
+                                  </p:childTnLst>
+                                </p:cTn>
+                              </p:par>
+                              <p:par>
+                                <p:cTn id="15" presetID="1" presetClass="entr" presetSubtype="0" fill="hold" grpId="0" nodeType="withEffect">
+                                  <p:stCondLst>
+                                    <p:cond delay="0"/>
+                                  </p:stCondLst>
+                                  <p:childTnLst>
+                                    <p:set>
+                                      <p:cBhvr>
+                                        <p:cTn id="16" dur="1" fill="hold">
+                                          <p:stCondLst>
+                                            <p:cond delay="0"/>
+                                          </p:stCondLst>
+                                        </p:cTn>
+                                        <p:tgtEl>
+                                          <p:spTgt spid="8"/>
+                                        </p:tgtEl>
+                                        <p:attrNameLst>
+                                          <p:attrName>style.visibility</p:attrName>
+                                        </p:attrNameLst>
+                                      </p:cBhvr>
+                                      <p:to>
+                                        <p:strVal val="visible"/>
+                                      </p:to>
+                                    </p:set>
+                                  </p:childTnLst>
+                                </p:cTn>
+                              </p:par>
+                            </p:childTnLst>
+                          </p:cTn>
+                        </p:par>
+                      </p:childTnLst>
+                    </p:cTn>
+                  </p:par>
+                </p:childTnLst>
+              </p:cTn>
+              <p:prevCondLst>
+                <p:cond evt="onPrev" delay="0">
+                  <p:tgtEl>
+                    <p:sldTgt/>
+                  </p:tgtEl>
+                </p:cond>
+              </p:prevCondLst>
+              <p:nextCondLst>
+                <p:cond evt="onNext" delay="0">
+                  <p:tgtEl>
+                    <p:sldTgt/>
+                  </p:tgtEl>
+                </p:cond>
+              </p:nextCondLst>
+            </p:seq>
+          </p:childTnLst>
+        </p:cTn>
+      </p:par>
+    </p:tnLst>
+    <p:bldLst>
+      <p:bldP spid="7" grpId="0" animBg="1"/>
+      <p:bldP spid="8" grpId="0" animBg="1"/>
+      <p:bldP spid="9" grpId="0" animBg="1"/>
+      <p:bldP spid="10" grpId="0" animBg="1"/>
+    </p:bldLst>
+  </p:timing>
+</p:sld>
+</file>
+
+<file path=ppt/slides/slide11.xml><?xml version="1.0" encoding="utf-8"?>
+<p:sld xmlns:a="http://schemas.openxmlformats.org/drawingml/2006/main" xmlns:r="http://schemas.openxmlformats.org/officeDocument/2006/relationships" xmlns:p="http://schemas.openxmlformats.org/presentationml/2006/main">
+  <p:cSld>
+    <p:spTree>
+      <p:nvGrpSpPr>
+        <p:cNvPr id="1" name=""/>
+        <p:cNvGrpSpPr/>
+        <p:nvPr/>
+      </p:nvGrpSpPr>
+      <p:grpSpPr>
+        <a:xfrm>
+          <a:off x="0" y="0"/>
+          <a:ext cx="0" cy="0"/>
+          <a:chOff x="0" y="0"/>
+          <a:chExt cx="0" cy="0"/>
+        </a:xfrm>
+      </p:grpSpPr>
+      <p:sp>
+        <p:nvSpPr>
+          <p:cNvPr id="2" name="Date Placeholder 1"/>
+          <p:cNvSpPr>
+            <a:spLocks noGrp="1"/>
+          </p:cNvSpPr>
+          <p:nvPr>
+            <p:ph type="dt" sz="half" idx="10"/>
+          </p:nvPr>
+        </p:nvSpPr>
+        <p:spPr/>
+        <p:txBody>
+          <a:bodyPr/>
+          <a:lstStyle/>
+          <a:p>
+            <a:fld id="{6700A58B-DD98-43D0-B791-721480A02982}" type="datetime1">
+              <a:rPr lang="en-US" smtClean="0"/>
+              <a:t>6/15/21</a:t>
+            </a:fld>
+            <a:endParaRPr lang="en-US"/>
+          </a:p>
+        </p:txBody>
+      </p:sp>
+      <p:sp>
+        <p:nvSpPr>
+          <p:cNvPr id="3" name="Title 2"/>
+          <p:cNvSpPr>
+            <a:spLocks noGrp="1"/>
+          </p:cNvSpPr>
+          <p:nvPr>
+            <p:ph type="title"/>
+          </p:nvPr>
+        </p:nvSpPr>
+        <p:spPr/>
+        <p:txBody>
+          <a:bodyPr/>
+          <a:lstStyle/>
+          <a:p>
+            <a:r>
+              <a:rPr lang="en-US" dirty="0"/>
+              <a:t>In this exercise we will examine song lyrics</a:t>
+            </a:r>
+          </a:p>
+        </p:txBody>
+      </p:sp>
+      <p:sp>
+        <p:nvSpPr>
+          <p:cNvPr id="4" name="Footer Placeholder 3"/>
+          <p:cNvSpPr>
+            <a:spLocks noGrp="1"/>
+          </p:cNvSpPr>
+          <p:nvPr>
+            <p:ph type="ftr" sz="quarter" idx="3"/>
+          </p:nvPr>
+        </p:nvSpPr>
+        <p:spPr/>
+        <p:txBody>
+          <a:bodyPr/>
+          <a:lstStyle/>
+          <a:p>
+            <a:r>
+              <a:rPr lang="en-US"/>
+              <a:t>Kwartler</a:t>
+            </a:r>
+            <a:endParaRPr lang="en-US" dirty="0"/>
+          </a:p>
+        </p:txBody>
+      </p:sp>
+      <p:sp>
+        <p:nvSpPr>
+          <p:cNvPr id="5" name="Slide Number Placeholder 4"/>
+          <p:cNvSpPr>
+            <a:spLocks noGrp="1"/>
+          </p:cNvSpPr>
+          <p:nvPr>
+            <p:ph type="sldNum" sz="quarter" idx="4"/>
+          </p:nvPr>
+        </p:nvSpPr>
+        <p:spPr/>
+        <p:txBody>
+          <a:bodyPr/>
+          <a:lstStyle/>
+          <a:p>
+            <a:fld id="{37290FF7-652B-4475-AEAB-8B1A5D23AE09}" type="slidenum">
+              <a:rPr lang="en-US" smtClean="0"/>
+              <a:pPr/>
+              <a:t>11</a:t>
             </a:fld>
             <a:endParaRPr lang="en-US" dirty="0"/>
           </a:p>
@@ -9871,7 +11047,7 @@
 </p:sld>
 </file>
 
-<file path=ppt/slides/slide11.xml><?xml version="1.0" encoding="utf-8"?>
+<file path=ppt/slides/slide12.xml><?xml version="1.0" encoding="utf-8"?>
 <p:sld xmlns:a="http://schemas.openxmlformats.org/drawingml/2006/main" xmlns:r="http://schemas.openxmlformats.org/officeDocument/2006/relationships" xmlns:p="http://schemas.openxmlformats.org/presentationml/2006/main">
   <p:cSld>
     <p:spTree>
@@ -9912,7 +11088,7 @@
             <a:fld id="{6700A58B-DD98-43D0-B791-721480A02982}" type="datetime1">
               <a:rPr lang="en-US" smtClean="0"/>
               <a:pPr/>
-              <a:t>1/10/21</a:t>
+              <a:t>6/15/21</a:t>
             </a:fld>
             <a:endParaRPr lang="en-US"/>
           </a:p>
@@ -10004,7 +11180,7 @@
             <a:fld id="{37290FF7-652B-4475-AEAB-8B1A5D23AE09}" type="slidenum">
               <a:rPr lang="en-US" smtClean="0"/>
               <a:pPr/>
-              <a:t>11</a:t>
+              <a:t>12</a:t>
             </a:fld>
             <a:endParaRPr lang="en-US"/>
           </a:p>
@@ -10337,7 +11513,7 @@
 </p:sld>
 </file>
 
-<file path=ppt/slides/slide12.xml><?xml version="1.0" encoding="utf-8"?>
+<file path=ppt/slides/slide13.xml><?xml version="1.0" encoding="utf-8"?>
 <p:sld xmlns:a="http://schemas.openxmlformats.org/drawingml/2006/main" xmlns:r="http://schemas.openxmlformats.org/officeDocument/2006/relationships" xmlns:p="http://schemas.openxmlformats.org/presentationml/2006/main">
   <p:cSld>
     <p:spTree>
@@ -10371,7 +11547,7 @@
           <a:p>
             <a:fld id="{6700A58B-DD98-43D0-B791-721480A02982}" type="datetime1">
               <a:rPr lang="en-US" smtClean="0"/>
-              <a:t>1/10/21</a:t>
+              <a:t>6/15/21</a:t>
             </a:fld>
             <a:endParaRPr lang="en-US"/>
           </a:p>
@@ -10445,7 +11621,7 @@
             <a:fld id="{37290FF7-652B-4475-AEAB-8B1A5D23AE09}" type="slidenum">
               <a:rPr lang="en-US" smtClean="0"/>
               <a:pPr/>
-              <a:t>12</a:t>
+              <a:t>13</a:t>
             </a:fld>
             <a:endParaRPr lang="en-US" dirty="0"/>
           </a:p>
@@ -12741,7 +13917,7 @@
 </p:sld>
 </file>
 
-<file path=ppt/slides/slide13.xml><?xml version="1.0" encoding="utf-8"?>
+<file path=ppt/slides/slide14.xml><?xml version="1.0" encoding="utf-8"?>
 <p:sld xmlns:a="http://schemas.openxmlformats.org/drawingml/2006/main" xmlns:r="http://schemas.openxmlformats.org/officeDocument/2006/relationships" xmlns:p="http://schemas.openxmlformats.org/presentationml/2006/main">
   <p:cSld>
     <p:spTree>
@@ -12775,7 +13951,7 @@
           <a:p>
             <a:fld id="{6700A58B-DD98-43D0-B791-721480A02982}" type="datetime1">
               <a:rPr lang="en-US" smtClean="0"/>
-              <a:t>1/10/21</a:t>
+              <a:t>6/15/21</a:t>
             </a:fld>
             <a:endParaRPr lang="en-US"/>
           </a:p>
@@ -12844,7 +14020,7 @@
             <a:fld id="{37290FF7-652B-4475-AEAB-8B1A5D23AE09}" type="slidenum">
               <a:rPr lang="en-US" smtClean="0"/>
               <a:pPr/>
-              <a:t>13</a:t>
+              <a:t>14</a:t>
             </a:fld>
             <a:endParaRPr lang="en-US" dirty="0"/>
           </a:p>
@@ -14056,7 +15232,7 @@
 </p:sld>
 </file>
 
-<file path=ppt/slides/slide14.xml><?xml version="1.0" encoding="utf-8"?>
+<file path=ppt/slides/slide15.xml><?xml version="1.0" encoding="utf-8"?>
 <p:sld xmlns:a="http://schemas.openxmlformats.org/drawingml/2006/main" xmlns:r="http://schemas.openxmlformats.org/officeDocument/2006/relationships" xmlns:p="http://schemas.openxmlformats.org/presentationml/2006/main">
   <p:cSld>
     <p:spTree>
@@ -14090,7 +15266,7 @@
           <a:p>
             <a:fld id="{6700A58B-DD98-43D0-B791-721480A02982}" type="datetime1">
               <a:rPr lang="en-US" smtClean="0"/>
-              <a:t>1/10/21</a:t>
+              <a:t>6/15/21</a:t>
             </a:fld>
             <a:endParaRPr lang="en-US"/>
           </a:p>
@@ -14159,7 +15335,7 @@
             <a:fld id="{37290FF7-652B-4475-AEAB-8B1A5D23AE09}" type="slidenum">
               <a:rPr lang="en-US" smtClean="0"/>
               <a:pPr/>
-              <a:t>14</a:t>
+              <a:t>15</a:t>
             </a:fld>
             <a:endParaRPr lang="en-US" dirty="0"/>
           </a:p>
@@ -14378,7 +15554,7 @@
             <a:fld id="{6700A58B-DD98-43D0-B791-721480A02982}" type="datetime1">
               <a:rPr lang="en-US" smtClean="0"/>
               <a:pPr/>
-              <a:t>1/10/21</a:t>
+              <a:t>6/15/21</a:t>
             </a:fld>
             <a:endParaRPr lang="en-US"/>
           </a:p>
@@ -14495,7 +15671,7 @@
         <p:spPr>
           <a:xfrm>
             <a:off x="240631" y="5593976"/>
-            <a:ext cx="6536687" cy="510989"/>
+            <a:ext cx="8617997" cy="510989"/>
           </a:xfrm>
           <a:prstGeom prst="rect">
             <a:avLst/>
@@ -14563,7 +15739,7 @@
         </p:nvGrpSpPr>
         <p:grpSpPr>
           <a:xfrm>
-            <a:off x="804505" y="1664188"/>
+            <a:off x="2425918" y="1696845"/>
             <a:ext cx="3689132" cy="2676504"/>
             <a:chOff x="433759" y="2081047"/>
             <a:chExt cx="3689132" cy="2676504"/>
@@ -14785,7 +15961,7 @@
           <a:p>
             <a:fld id="{6700A58B-DD98-43D0-B791-721480A02982}" type="datetime1">
               <a:rPr lang="en-US" smtClean="0"/>
-              <a:t>1/10/21</a:t>
+              <a:t>6/15/21</a:t>
             </a:fld>
             <a:endParaRPr lang="en-US"/>
           </a:p>
@@ -14888,7 +16064,7 @@
         </p:xfrm>
         <a:graphic>
           <a:graphicData uri="http://schemas.openxmlformats.org/drawingml/2006/chart">
-            <c:chart xmlns:c="http://schemas.openxmlformats.org/drawingml/2006/chart" xmlns:r="http://schemas.openxmlformats.org/officeDocument/2006/relationships" r:id="rId2"/>
+            <c:chart xmlns:c="http://schemas.openxmlformats.org/drawingml/2006/chart" xmlns:r="http://schemas.openxmlformats.org/officeDocument/2006/relationships" r:id="rId3"/>
           </a:graphicData>
         </a:graphic>
       </p:graphicFrame>
@@ -14906,8 +16082,8 @@
         </p:nvSpPr>
         <p:spPr>
           <a:xfrm>
-            <a:off x="240632" y="5499847"/>
-            <a:ext cx="6550134" cy="605118"/>
+            <a:off x="240631" y="5499847"/>
+            <a:ext cx="8274707" cy="605118"/>
           </a:xfrm>
           <a:prstGeom prst="rect">
             <a:avLst/>
@@ -15182,7 +16358,7 @@
           <a:p>
             <a:fld id="{6700A58B-DD98-43D0-B791-721480A02982}" type="datetime1">
               <a:rPr lang="en-US" smtClean="0"/>
-              <a:t>1/10/21</a:t>
+              <a:t>6/15/21</a:t>
             </a:fld>
             <a:endParaRPr lang="en-US"/>
           </a:p>
@@ -15757,7 +16933,7 @@
           <a:p>
             <a:fld id="{6700A58B-DD98-43D0-B791-721480A02982}" type="datetime1">
               <a:rPr lang="en-US" smtClean="0"/>
-              <a:t>1/10/21</a:t>
+              <a:t>6/15/21</a:t>
             </a:fld>
             <a:endParaRPr lang="en-US"/>
           </a:p>
@@ -16208,6 +17384,626 @@
 <file path=ppt/slides/slide6.xml><?xml version="1.0" encoding="utf-8"?>
 <p:sld xmlns:a="http://schemas.openxmlformats.org/drawingml/2006/main" xmlns:r="http://schemas.openxmlformats.org/officeDocument/2006/relationships" xmlns:p="http://schemas.openxmlformats.org/presentationml/2006/main">
   <p:cSld>
+    <p:spTree>
+      <p:nvGrpSpPr>
+        <p:cNvPr id="1" name=""/>
+        <p:cNvGrpSpPr/>
+        <p:nvPr/>
+      </p:nvGrpSpPr>
+      <p:grpSpPr>
+        <a:xfrm>
+          <a:off x="0" y="0"/>
+          <a:ext cx="0" cy="0"/>
+          <a:chOff x="0" y="0"/>
+          <a:chExt cx="0" cy="0"/>
+        </a:xfrm>
+      </p:grpSpPr>
+      <p:sp>
+        <p:nvSpPr>
+          <p:cNvPr id="2" name="Title 1"/>
+          <p:cNvSpPr>
+            <a:spLocks noGrp="1"/>
+          </p:cNvSpPr>
+          <p:nvPr>
+            <p:ph type="title"/>
+          </p:nvPr>
+        </p:nvSpPr>
+        <p:spPr/>
+        <p:txBody>
+          <a:bodyPr>
+            <a:normAutofit/>
+          </a:bodyPr>
+          <a:lstStyle/>
+          <a:p>
+            <a:r>
+              <a:rPr lang="en-US" dirty="0"/>
+              <a:t>A simple yet effective measure of polarity</a:t>
+            </a:r>
+          </a:p>
+        </p:txBody>
+      </p:sp>
+      <p:sp>
+        <p:nvSpPr>
+          <p:cNvPr id="8" name="Rectangle 7"/>
+          <p:cNvSpPr/>
+          <p:nvPr/>
+        </p:nvSpPr>
+        <p:spPr>
+          <a:xfrm>
+            <a:off x="334476" y="1159660"/>
+            <a:ext cx="8484403" cy="4959785"/>
+          </a:xfrm>
+          <a:prstGeom prst="rect">
+            <a:avLst/>
+          </a:prstGeom>
+          <a:solidFill>
+            <a:schemeClr val="bg1">
+              <a:lumMod val="95000"/>
+            </a:schemeClr>
+          </a:solidFill>
+          <a:ln>
+            <a:noFill/>
+          </a:ln>
+          <a:effectLst>
+            <a:outerShdw blurRad="50800" dist="38100" dir="2700000" algn="tl" rotWithShape="0">
+              <a:prstClr val="black">
+                <a:alpha val="40000"/>
+              </a:prstClr>
+            </a:outerShdw>
+          </a:effectLst>
+        </p:spPr>
+        <p:style>
+          <a:lnRef idx="2">
+            <a:schemeClr val="accent1">
+              <a:shade val="50000"/>
+            </a:schemeClr>
+          </a:lnRef>
+          <a:fillRef idx="1">
+            <a:schemeClr val="accent1"/>
+          </a:fillRef>
+          <a:effectRef idx="0">
+            <a:schemeClr val="accent1"/>
+          </a:effectRef>
+          <a:fontRef idx="minor">
+            <a:schemeClr val="lt1"/>
+          </a:fontRef>
+        </p:style>
+        <p:txBody>
+          <a:bodyPr rtlCol="0" anchor="ctr"/>
+          <a:lstStyle/>
+          <a:p>
+            <a:pPr marL="120650" indent="-120650" defTabSz="457200">
+              <a:buFont typeface="Arial" panose="020B0604020202020204" pitchFamily="34" charset="0"/>
+              <a:buChar char="•"/>
+            </a:pPr>
+            <a:endParaRPr lang="en-US" sz="2000" b="1" kern="1200" dirty="0">
+              <a:solidFill>
+                <a:prstClr val="white"/>
+              </a:solidFill>
+              <a:latin typeface="Arial Unicode MS" panose="020B0604020202020204" pitchFamily="34" charset="-128"/>
+              <a:cs typeface="Arial Unicode MS" panose="020B0604020202020204" pitchFamily="34" charset="-128"/>
+            </a:endParaRPr>
+          </a:p>
+        </p:txBody>
+      </p:sp>
+      <p:sp>
+        <p:nvSpPr>
+          <p:cNvPr id="9" name="Rectangle 8"/>
+          <p:cNvSpPr/>
+          <p:nvPr/>
+        </p:nvSpPr>
+        <p:spPr>
+          <a:xfrm>
+            <a:off x="334477" y="1157657"/>
+            <a:ext cx="8484402" cy="457200"/>
+          </a:xfrm>
+          <a:prstGeom prst="rect">
+            <a:avLst/>
+          </a:prstGeom>
+          <a:solidFill>
+            <a:schemeClr val="bg1">
+              <a:lumMod val="50000"/>
+            </a:schemeClr>
+          </a:solidFill>
+          <a:ln>
+            <a:noFill/>
+          </a:ln>
+        </p:spPr>
+        <p:style>
+          <a:lnRef idx="2">
+            <a:schemeClr val="accent1">
+              <a:shade val="50000"/>
+            </a:schemeClr>
+          </a:lnRef>
+          <a:fillRef idx="1">
+            <a:schemeClr val="accent1"/>
+          </a:fillRef>
+          <a:effectRef idx="0">
+            <a:schemeClr val="accent1"/>
+          </a:effectRef>
+          <a:fontRef idx="minor">
+            <a:schemeClr val="lt1"/>
+          </a:fontRef>
+        </p:style>
+        <p:txBody>
+          <a:bodyPr rtlCol="0" anchor="ctr"/>
+          <a:lstStyle/>
+          <a:p>
+            <a:pPr algn="ctr" defTabSz="457200"/>
+            <a:r>
+              <a:rPr lang="en-US" sz="2400" b="1" u="sng" kern="1200" dirty="0">
+                <a:solidFill>
+                  <a:prstClr val="white"/>
+                </a:solidFill>
+                <a:latin typeface="Arial Unicode MS" panose="020B0604020202020204" pitchFamily="34" charset="-128"/>
+                <a:cs typeface="Arial Unicode MS" panose="020B0604020202020204" pitchFamily="34" charset="-128"/>
+              </a:rPr>
+              <a:t>Scoring</a:t>
+            </a:r>
+          </a:p>
+        </p:txBody>
+      </p:sp>
+      <p:sp>
+        <p:nvSpPr>
+          <p:cNvPr id="16" name="TextBox 15"/>
+          <p:cNvSpPr txBox="1"/>
+          <p:nvPr/>
+        </p:nvSpPr>
+        <p:spPr>
+          <a:xfrm>
+            <a:off x="530088" y="1674845"/>
+            <a:ext cx="6233784" cy="3323987"/>
+          </a:xfrm>
+          <a:prstGeom prst="rect">
+            <a:avLst/>
+          </a:prstGeom>
+          <a:noFill/>
+        </p:spPr>
+        <p:txBody>
+          <a:bodyPr wrap="square" rtlCol="0">
+            <a:spAutoFit/>
+          </a:bodyPr>
+          <a:lstStyle/>
+          <a:p>
+            <a:pPr marL="342900" indent="-342900" defTabSz="457200">
+              <a:buAutoNum type="arabicPeriod"/>
+            </a:pPr>
+            <a:r>
+              <a:rPr lang="en-US" sz="1500" b="1" dirty="0">
+                <a:solidFill>
+                  <a:prstClr val="black"/>
+                </a:solidFill>
+                <a:latin typeface="Arial Unicode MS" panose="020B0604020202020204" pitchFamily="34" charset="-128"/>
+                <a:ea typeface="Arial Unicode MS" panose="020B0604020202020204" pitchFamily="34" charset="-128"/>
+                <a:cs typeface="Arial Unicode MS" panose="020B0604020202020204" pitchFamily="34" charset="-128"/>
+              </a:rPr>
+              <a:t>Identify a polarized word from a lexicon</a:t>
+            </a:r>
+          </a:p>
+          <a:p>
+            <a:pPr marL="342900" indent="-342900" defTabSz="457200">
+              <a:buAutoNum type="arabicPeriod"/>
+            </a:pPr>
+            <a:r>
+              <a:rPr lang="en-US" sz="1500" b="1" kern="1200" dirty="0">
+                <a:solidFill>
+                  <a:prstClr val="black"/>
+                </a:solidFill>
+                <a:latin typeface="Arial Unicode MS" panose="020B0604020202020204" pitchFamily="34" charset="-128"/>
+                <a:ea typeface="Arial Unicode MS" panose="020B0604020202020204" pitchFamily="34" charset="-128"/>
+                <a:cs typeface="Arial Unicode MS" panose="020B0604020202020204" pitchFamily="34" charset="-128"/>
+              </a:rPr>
+              <a:t>Identify “context cluster”</a:t>
+            </a:r>
+          </a:p>
+          <a:p>
+            <a:pPr marL="800100" lvl="1" indent="-342900" defTabSz="457200">
+              <a:buAutoNum type="arabicPeriod"/>
+            </a:pPr>
+            <a:r>
+              <a:rPr lang="en-US" sz="1500" dirty="0">
+                <a:solidFill>
+                  <a:prstClr val="black"/>
+                </a:solidFill>
+                <a:latin typeface="Arial Unicode MS" panose="020B0604020202020204" pitchFamily="34" charset="-128"/>
+                <a:ea typeface="Arial Unicode MS" panose="020B0604020202020204" pitchFamily="34" charset="-128"/>
+                <a:cs typeface="Arial Unicode MS" panose="020B0604020202020204" pitchFamily="34" charset="-128"/>
+              </a:rPr>
+              <a:t>ID Neutral Words </a:t>
+            </a:r>
+          </a:p>
+          <a:p>
+            <a:pPr marL="800100" lvl="1" indent="-342900" defTabSz="457200">
+              <a:buAutoNum type="arabicPeriod"/>
+            </a:pPr>
+            <a:r>
+              <a:rPr lang="en-US" sz="1500" kern="1200" dirty="0">
+                <a:solidFill>
+                  <a:prstClr val="black"/>
+                </a:solidFill>
+                <a:latin typeface="Arial Unicode MS" panose="020B0604020202020204" pitchFamily="34" charset="-128"/>
+                <a:ea typeface="Arial Unicode MS" panose="020B0604020202020204" pitchFamily="34" charset="-128"/>
+                <a:cs typeface="Arial Unicode MS" panose="020B0604020202020204" pitchFamily="34" charset="-128"/>
+              </a:rPr>
+              <a:t>ID Amplifiers “very”</a:t>
+            </a:r>
+          </a:p>
+          <a:p>
+            <a:pPr marL="800100" lvl="1" indent="-342900" defTabSz="457200">
+              <a:buAutoNum type="arabicPeriod"/>
+            </a:pPr>
+            <a:r>
+              <a:rPr lang="en-US" sz="1500" dirty="0">
+                <a:solidFill>
+                  <a:prstClr val="black"/>
+                </a:solidFill>
+                <a:latin typeface="Arial Unicode MS" panose="020B0604020202020204" pitchFamily="34" charset="-128"/>
+                <a:ea typeface="Arial Unicode MS" panose="020B0604020202020204" pitchFamily="34" charset="-128"/>
+                <a:cs typeface="Arial Unicode MS" panose="020B0604020202020204" pitchFamily="34" charset="-128"/>
+              </a:rPr>
+              <a:t>ID d</a:t>
+            </a:r>
+            <a:r>
+              <a:rPr lang="en-US" sz="1500" kern="1200" dirty="0">
+                <a:solidFill>
+                  <a:prstClr val="black"/>
+                </a:solidFill>
+                <a:latin typeface="Arial Unicode MS" panose="020B0604020202020204" pitchFamily="34" charset="-128"/>
+                <a:ea typeface="Arial Unicode MS" panose="020B0604020202020204" pitchFamily="34" charset="-128"/>
+                <a:cs typeface="Arial Unicode MS" panose="020B0604020202020204" pitchFamily="34" charset="-128"/>
+              </a:rPr>
+              <a:t>e-amplifiers i.e. “hardly”</a:t>
+            </a:r>
+          </a:p>
+          <a:p>
+            <a:pPr marL="800100" lvl="1" indent="-342900" defTabSz="457200">
+              <a:buAutoNum type="arabicPeriod"/>
+            </a:pPr>
+            <a:r>
+              <a:rPr lang="en-US" sz="1500" dirty="0">
+                <a:solidFill>
+                  <a:prstClr val="black"/>
+                </a:solidFill>
+                <a:latin typeface="Arial Unicode MS" panose="020B0604020202020204" pitchFamily="34" charset="-128"/>
+                <a:ea typeface="Arial Unicode MS" panose="020B0604020202020204" pitchFamily="34" charset="-128"/>
+                <a:cs typeface="Arial Unicode MS" panose="020B0604020202020204" pitchFamily="34" charset="-128"/>
+              </a:rPr>
+              <a:t>ID Negators i.e. “not”</a:t>
+            </a:r>
+            <a:endParaRPr lang="en-US" sz="1500" kern="1200" dirty="0">
+              <a:solidFill>
+                <a:prstClr val="black"/>
+              </a:solidFill>
+              <a:latin typeface="Arial Unicode MS" panose="020B0604020202020204" pitchFamily="34" charset="-128"/>
+              <a:ea typeface="Arial Unicode MS" panose="020B0604020202020204" pitchFamily="34" charset="-128"/>
+              <a:cs typeface="Arial Unicode MS" panose="020B0604020202020204" pitchFamily="34" charset="-128"/>
+            </a:endParaRPr>
+          </a:p>
+          <a:p>
+            <a:pPr marL="342900" indent="-342900" defTabSz="457200">
+              <a:buAutoNum type="arabicPeriod"/>
+            </a:pPr>
+            <a:r>
+              <a:rPr lang="en-US" sz="1500" b="1" kern="1200" dirty="0">
+                <a:solidFill>
+                  <a:prstClr val="black"/>
+                </a:solidFill>
+                <a:latin typeface="Arial Unicode MS" panose="020B0604020202020204" pitchFamily="34" charset="-128"/>
+                <a:ea typeface="Arial Unicode MS" panose="020B0604020202020204" pitchFamily="34" charset="-128"/>
+                <a:cs typeface="Arial Unicode MS" panose="020B0604020202020204" pitchFamily="34" charset="-128"/>
+              </a:rPr>
+              <a:t>Assign Values </a:t>
+            </a:r>
+          </a:p>
+          <a:p>
+            <a:pPr marL="800100" lvl="1" indent="-342900" defTabSz="457200">
+              <a:buAutoNum type="arabicPeriod"/>
+            </a:pPr>
+            <a:r>
+              <a:rPr lang="en-US" sz="1500" dirty="0">
+                <a:solidFill>
+                  <a:prstClr val="black"/>
+                </a:solidFill>
+                <a:latin typeface="Arial Unicode MS" panose="020B0604020202020204" pitchFamily="34" charset="-128"/>
+                <a:ea typeface="Arial Unicode MS" panose="020B0604020202020204" pitchFamily="34" charset="-128"/>
+                <a:cs typeface="Arial Unicode MS" panose="020B0604020202020204" pitchFamily="34" charset="-128"/>
+              </a:rPr>
+              <a:t>Neutral Words = 0</a:t>
+            </a:r>
+          </a:p>
+          <a:p>
+            <a:pPr marL="800100" lvl="1" indent="-342900" defTabSz="457200">
+              <a:buAutoNum type="arabicPeriod"/>
+            </a:pPr>
+            <a:r>
+              <a:rPr lang="en-US" sz="1500" dirty="0">
+                <a:solidFill>
+                  <a:prstClr val="black"/>
+                </a:solidFill>
+                <a:latin typeface="Arial Unicode MS" panose="020B0604020202020204" pitchFamily="34" charset="-128"/>
+                <a:ea typeface="Arial Unicode MS" panose="020B0604020202020204" pitchFamily="34" charset="-128"/>
+                <a:cs typeface="Arial Unicode MS" panose="020B0604020202020204" pitchFamily="34" charset="-128"/>
+              </a:rPr>
+              <a:t>Amplifiers = 0.8</a:t>
+            </a:r>
+          </a:p>
+          <a:p>
+            <a:pPr marL="800100" lvl="1" indent="-342900" defTabSz="457200">
+              <a:buAutoNum type="arabicPeriod"/>
+            </a:pPr>
+            <a:r>
+              <a:rPr lang="en-US" sz="1500" dirty="0">
+                <a:solidFill>
+                  <a:prstClr val="black"/>
+                </a:solidFill>
+                <a:latin typeface="Arial Unicode MS" panose="020B0604020202020204" pitchFamily="34" charset="-128"/>
+                <a:ea typeface="Arial Unicode MS" panose="020B0604020202020204" pitchFamily="34" charset="-128"/>
+                <a:cs typeface="Arial Unicode MS" panose="020B0604020202020204" pitchFamily="34" charset="-128"/>
+              </a:rPr>
+              <a:t>De-amplifiers = -0.8</a:t>
+            </a:r>
+          </a:p>
+          <a:p>
+            <a:pPr marL="800100" lvl="1" indent="-342900" defTabSz="457200">
+              <a:buAutoNum type="arabicPeriod"/>
+            </a:pPr>
+            <a:r>
+              <a:rPr lang="en-US" sz="1500" dirty="0">
+                <a:solidFill>
+                  <a:prstClr val="black"/>
+                </a:solidFill>
+                <a:latin typeface="Arial Unicode MS" panose="020B0604020202020204" pitchFamily="34" charset="-128"/>
+                <a:ea typeface="Arial Unicode MS" panose="020B0604020202020204" pitchFamily="34" charset="-128"/>
+                <a:cs typeface="Arial Unicode MS" panose="020B0604020202020204" pitchFamily="34" charset="-128"/>
+              </a:rPr>
+              <a:t>ID Negators = -1 * </a:t>
+            </a:r>
+          </a:p>
+          <a:p>
+            <a:pPr marL="342900" indent="-342900" defTabSz="457200">
+              <a:buAutoNum type="arabicPeriod"/>
+            </a:pPr>
+            <a:r>
+              <a:rPr lang="en-US" sz="1500" b="1" kern="1200" dirty="0">
+                <a:solidFill>
+                  <a:prstClr val="black"/>
+                </a:solidFill>
+                <a:latin typeface="Arial Unicode MS" panose="020B0604020202020204" pitchFamily="34" charset="-128"/>
+                <a:ea typeface="Arial Unicode MS" panose="020B0604020202020204" pitchFamily="34" charset="-128"/>
+                <a:cs typeface="Arial Unicode MS" panose="020B0604020202020204" pitchFamily="34" charset="-128"/>
+              </a:rPr>
+              <a:t>Sum Values</a:t>
+            </a:r>
+          </a:p>
+          <a:p>
+            <a:pPr marL="342900" indent="-342900" defTabSz="457200">
+              <a:buAutoNum type="arabicPeriod"/>
+            </a:pPr>
+            <a:r>
+              <a:rPr lang="en-US" sz="1500" b="1" dirty="0">
+                <a:solidFill>
+                  <a:prstClr val="black"/>
+                </a:solidFill>
+                <a:latin typeface="Arial Unicode MS" panose="020B0604020202020204" pitchFamily="34" charset="-128"/>
+                <a:ea typeface="Arial Unicode MS" panose="020B0604020202020204" pitchFamily="34" charset="-128"/>
+                <a:cs typeface="Arial Unicode MS" panose="020B0604020202020204" pitchFamily="34" charset="-128"/>
+              </a:rPr>
+              <a:t>Divide Sum by sqrt of word count </a:t>
+            </a:r>
+            <a:r>
+              <a:rPr lang="en-US" sz="1500" dirty="0">
+                <a:solidFill>
+                  <a:prstClr val="black"/>
+                </a:solidFill>
+                <a:latin typeface="Arial Unicode MS" panose="020B0604020202020204" pitchFamily="34" charset="-128"/>
+                <a:ea typeface="Arial Unicode MS" panose="020B0604020202020204" pitchFamily="34" charset="-128"/>
+                <a:cs typeface="Arial Unicode MS" panose="020B0604020202020204" pitchFamily="34" charset="-128"/>
+              </a:rPr>
+              <a:t>– accounts for length of document “how dense the polarity is”</a:t>
+            </a:r>
+            <a:endParaRPr lang="en-US" sz="1500" kern="1200" dirty="0">
+              <a:solidFill>
+                <a:prstClr val="black"/>
+              </a:solidFill>
+              <a:latin typeface="Arial Unicode MS" panose="020B0604020202020204" pitchFamily="34" charset="-128"/>
+              <a:ea typeface="Arial Unicode MS" panose="020B0604020202020204" pitchFamily="34" charset="-128"/>
+              <a:cs typeface="Arial Unicode MS" panose="020B0604020202020204" pitchFamily="34" charset="-128"/>
+            </a:endParaRPr>
+          </a:p>
+        </p:txBody>
+      </p:sp>
+      <p:sp>
+        <p:nvSpPr>
+          <p:cNvPr id="11" name="Footer Placeholder 5">
+            <a:extLst>
+              <a:ext uri="{FF2B5EF4-FFF2-40B4-BE49-F238E27FC236}">
+                <a16:creationId xmlns:a16="http://schemas.microsoft.com/office/drawing/2014/main" id="{966A28C3-CD6B-42ED-BBBD-47C0AC8CD3BC}"/>
+              </a:ext>
+            </a:extLst>
+          </p:cNvPr>
+          <p:cNvSpPr>
+            <a:spLocks noGrp="1"/>
+          </p:cNvSpPr>
+          <p:nvPr>
+            <p:ph type="ftr" sz="quarter" idx="3"/>
+          </p:nvPr>
+        </p:nvSpPr>
+        <p:spPr>
+          <a:xfrm>
+            <a:off x="3028950" y="6356351"/>
+            <a:ext cx="3086100" cy="365125"/>
+          </a:xfrm>
+        </p:spPr>
+        <p:txBody>
+          <a:bodyPr/>
+          <a:lstStyle/>
+          <a:p>
+            <a:r>
+              <a:rPr lang="en-US" dirty="0"/>
+              <a:t>Kwartler</a:t>
+            </a:r>
+          </a:p>
+        </p:txBody>
+      </p:sp>
+      <p:sp>
+        <p:nvSpPr>
+          <p:cNvPr id="5" name="Rectangle 4">
+            <a:extLst>
+              <a:ext uri="{FF2B5EF4-FFF2-40B4-BE49-F238E27FC236}">
+                <a16:creationId xmlns:a16="http://schemas.microsoft.com/office/drawing/2014/main" id="{D6BC52BC-3A2D-2D4F-9863-A1066DAB60F6}"/>
+              </a:ext>
+            </a:extLst>
+          </p:cNvPr>
+          <p:cNvSpPr/>
+          <p:nvPr/>
+        </p:nvSpPr>
+        <p:spPr>
+          <a:xfrm>
+            <a:off x="516835" y="5486400"/>
+            <a:ext cx="7998515" cy="463826"/>
+          </a:xfrm>
+          <a:prstGeom prst="rect">
+            <a:avLst/>
+          </a:prstGeom>
+        </p:spPr>
+        <p:style>
+          <a:lnRef idx="2">
+            <a:schemeClr val="accent1">
+              <a:shade val="50000"/>
+            </a:schemeClr>
+          </a:lnRef>
+          <a:fillRef idx="1">
+            <a:schemeClr val="accent1"/>
+          </a:fillRef>
+          <a:effectRef idx="0">
+            <a:schemeClr val="accent1"/>
+          </a:effectRef>
+          <a:fontRef idx="minor">
+            <a:schemeClr val="lt1"/>
+          </a:fontRef>
+        </p:style>
+        <p:txBody>
+          <a:bodyPr rtlCol="0" anchor="ctr"/>
+          <a:lstStyle/>
+          <a:p>
+            <a:pPr algn="ctr"/>
+            <a:r>
+              <a:rPr lang="en-US" dirty="0"/>
+              <a:t>Let’s open ﻿</a:t>
+            </a:r>
+            <a:r>
+              <a:rPr lang="en-US" dirty="0" err="1"/>
+              <a:t>A_polarity_math.R</a:t>
+            </a:r>
+            <a:r>
+              <a:rPr lang="en-US" dirty="0"/>
+              <a:t> to see it in action.</a:t>
+            </a:r>
+          </a:p>
+        </p:txBody>
+      </p:sp>
+      <p:cxnSp>
+        <p:nvCxnSpPr>
+          <p:cNvPr id="10" name="Straight Connector 9">
+            <a:extLst>
+              <a:ext uri="{FF2B5EF4-FFF2-40B4-BE49-F238E27FC236}">
+                <a16:creationId xmlns:a16="http://schemas.microsoft.com/office/drawing/2014/main" id="{EE912FC4-D092-D941-8D15-6CFBCAEA270C}"/>
+              </a:ext>
+            </a:extLst>
+          </p:cNvPr>
+          <p:cNvCxnSpPr/>
+          <p:nvPr/>
+        </p:nvCxnSpPr>
+        <p:spPr>
+          <a:xfrm>
+            <a:off x="6798363" y="6549885"/>
+            <a:ext cx="0" cy="182880"/>
+          </a:xfrm>
+          <a:prstGeom prst="line">
+            <a:avLst/>
+          </a:prstGeom>
+          <a:ln>
+            <a:solidFill>
+              <a:schemeClr val="bg1">
+                <a:lumMod val="85000"/>
+              </a:schemeClr>
+            </a:solidFill>
+          </a:ln>
+        </p:spPr>
+        <p:style>
+          <a:lnRef idx="1">
+            <a:schemeClr val="accent1"/>
+          </a:lnRef>
+          <a:fillRef idx="0">
+            <a:schemeClr val="accent1"/>
+          </a:fillRef>
+          <a:effectRef idx="0">
+            <a:schemeClr val="accent1"/>
+          </a:effectRef>
+          <a:fontRef idx="minor">
+            <a:schemeClr val="tx1"/>
+          </a:fontRef>
+        </p:style>
+      </p:cxnSp>
+      <p:cxnSp>
+        <p:nvCxnSpPr>
+          <p:cNvPr id="12" name="Straight Connector 11">
+            <a:extLst>
+              <a:ext uri="{FF2B5EF4-FFF2-40B4-BE49-F238E27FC236}">
+                <a16:creationId xmlns:a16="http://schemas.microsoft.com/office/drawing/2014/main" id="{99689052-05DB-1D4B-A1AF-66A6E4430635}"/>
+              </a:ext>
+            </a:extLst>
+          </p:cNvPr>
+          <p:cNvCxnSpPr/>
+          <p:nvPr/>
+        </p:nvCxnSpPr>
+        <p:spPr>
+          <a:xfrm>
+            <a:off x="7076661" y="4664763"/>
+            <a:ext cx="182880" cy="0"/>
+          </a:xfrm>
+          <a:prstGeom prst="line">
+            <a:avLst/>
+          </a:prstGeom>
+          <a:ln>
+            <a:solidFill>
+              <a:schemeClr val="bg1">
+                <a:lumMod val="85000"/>
+              </a:schemeClr>
+            </a:solidFill>
+          </a:ln>
+        </p:spPr>
+        <p:style>
+          <a:lnRef idx="1">
+            <a:schemeClr val="accent1"/>
+          </a:lnRef>
+          <a:fillRef idx="0">
+            <a:schemeClr val="accent1"/>
+          </a:fillRef>
+          <a:effectRef idx="0">
+            <a:schemeClr val="accent1"/>
+          </a:effectRef>
+          <a:fontRef idx="minor">
+            <a:schemeClr val="tx1"/>
+          </a:fontRef>
+        </p:style>
+      </p:cxnSp>
+    </p:spTree>
+    <p:extLst>
+      <p:ext uri="{BB962C8B-B14F-4D97-AF65-F5344CB8AC3E}">
+        <p14:creationId xmlns:p14="http://schemas.microsoft.com/office/powerpoint/2010/main" val="4100425887"/>
+      </p:ext>
+    </p:extLst>
+  </p:cSld>
+  <p:clrMapOvr>
+    <a:masterClrMapping/>
+  </p:clrMapOvr>
+</p:sld>
+</file>
+
+<file path=ppt/slides/slide7.xml><?xml version="1.0" encoding="utf-8"?>
+<p:sld xmlns:a="http://schemas.openxmlformats.org/drawingml/2006/main" xmlns:r="http://schemas.openxmlformats.org/officeDocument/2006/relationships" xmlns:p="http://schemas.openxmlformats.org/presentationml/2006/main">
+  <p:cSld>
     <p:bg>
       <p:bgPr>
         <a:solidFill>
@@ -16488,7 +18284,7 @@
                   <a:spcPts val="600"/>
                 </a:spcAft>
               </a:pPr>
-              <a:t>1/10/21</a:t>
+              <a:t>6/15/21</a:t>
             </a:fld>
             <a:endParaRPr lang="en-US" sz="1200">
               <a:solidFill>
@@ -16552,7 +18348,7 @@
                   <a:spcPts val="600"/>
                 </a:spcAft>
               </a:pPr>
-              <a:t>6</a:t>
+              <a:t>7</a:t>
             </a:fld>
             <a:endParaRPr lang="en-US" sz="1000">
               <a:solidFill>
@@ -16577,7 +18373,7 @@
 </p:sld>
 </file>
 
-<file path=ppt/slides/slide7.xml><?xml version="1.0" encoding="utf-8"?>
+<file path=ppt/slides/slide8.xml><?xml version="1.0" encoding="utf-8"?>
 <p:sld xmlns:a="http://schemas.openxmlformats.org/drawingml/2006/main" xmlns:r="http://schemas.openxmlformats.org/officeDocument/2006/relationships" xmlns:p="http://schemas.openxmlformats.org/presentationml/2006/main">
   <p:cSld>
     <p:spTree>
@@ -16611,7 +18407,7 @@
           <a:p>
             <a:fld id="{6700A58B-DD98-43D0-B791-721480A02982}" type="datetime1">
               <a:rPr lang="en-US" smtClean="0"/>
-              <a:t>1/10/21</a:t>
+              <a:t>6/15/21</a:t>
             </a:fld>
             <a:endParaRPr lang="en-US"/>
           </a:p>
@@ -16685,7 +18481,7 @@
             <a:fld id="{37290FF7-652B-4475-AEAB-8B1A5D23AE09}" type="slidenum">
               <a:rPr lang="en-US" smtClean="0"/>
               <a:pPr/>
-              <a:t>7</a:t>
+              <a:t>8</a:t>
             </a:fld>
             <a:endParaRPr lang="en-US" dirty="0"/>
           </a:p>
@@ -19031,7 +20827,7 @@
 </p:sld>
 </file>
 
-<file path=ppt/slides/slide8.xml><?xml version="1.0" encoding="utf-8"?>
+<file path=ppt/slides/slide9.xml><?xml version="1.0" encoding="utf-8"?>
 <p:sld xmlns:a="http://schemas.openxmlformats.org/drawingml/2006/main" xmlns:r="http://schemas.openxmlformats.org/officeDocument/2006/relationships" xmlns:p="http://schemas.openxmlformats.org/presentationml/2006/main">
   <p:cSld>
     <p:spTree>
@@ -19065,7 +20861,7 @@
           <a:p>
             <a:fld id="{6700A58B-DD98-43D0-B791-721480A02982}" type="datetime1">
               <a:rPr lang="en-US" smtClean="0"/>
-              <a:t>1/10/21</a:t>
+              <a:t>6/15/21</a:t>
             </a:fld>
             <a:endParaRPr lang="en-US"/>
           </a:p>
@@ -19134,7 +20930,7 @@
             <a:fld id="{37290FF7-652B-4475-AEAB-8B1A5D23AE09}" type="slidenum">
               <a:rPr lang="en-US" smtClean="0"/>
               <a:pPr/>
-              <a:t>8</a:t>
+              <a:t>9</a:t>
             </a:fld>
             <a:endParaRPr lang="en-US" dirty="0"/>
           </a:p>
@@ -19277,1097 +21073,6 @@
   <p:clrMapOvr>
     <a:masterClrMapping/>
   </p:clrMapOvr>
-</p:sld>
-</file>
-
-<file path=ppt/slides/slide9.xml><?xml version="1.0" encoding="utf-8"?>
-<p:sld xmlns:a="http://schemas.openxmlformats.org/drawingml/2006/main" xmlns:r="http://schemas.openxmlformats.org/officeDocument/2006/relationships" xmlns:p="http://schemas.openxmlformats.org/presentationml/2006/main">
-  <p:cSld>
-    <p:spTree>
-      <p:nvGrpSpPr>
-        <p:cNvPr id="1" name=""/>
-        <p:cNvGrpSpPr/>
-        <p:nvPr/>
-      </p:nvGrpSpPr>
-      <p:grpSpPr>
-        <a:xfrm>
-          <a:off x="0" y="0"/>
-          <a:ext cx="0" cy="0"/>
-          <a:chOff x="0" y="0"/>
-          <a:chExt cx="0" cy="0"/>
-        </a:xfrm>
-      </p:grpSpPr>
-      <p:sp>
-        <p:nvSpPr>
-          <p:cNvPr id="2" name="Date Placeholder 1"/>
-          <p:cNvSpPr>
-            <a:spLocks noGrp="1"/>
-          </p:cNvSpPr>
-          <p:nvPr>
-            <p:ph type="dt" sz="half" idx="10"/>
-          </p:nvPr>
-        </p:nvSpPr>
-        <p:spPr/>
-        <p:txBody>
-          <a:bodyPr/>
-          <a:lstStyle/>
-          <a:p>
-            <a:fld id="{6700A58B-DD98-43D0-B791-721480A02982}" type="datetime1">
-              <a:rPr lang="en-US" smtClean="0"/>
-              <a:t>1/10/21</a:t>
-            </a:fld>
-            <a:endParaRPr lang="en-US"/>
-          </a:p>
-        </p:txBody>
-      </p:sp>
-      <p:sp>
-        <p:nvSpPr>
-          <p:cNvPr id="3" name="Title 2"/>
-          <p:cNvSpPr>
-            <a:spLocks noGrp="1"/>
-          </p:cNvSpPr>
-          <p:nvPr>
-            <p:ph type="title"/>
-          </p:nvPr>
-        </p:nvSpPr>
-        <p:spPr/>
-        <p:txBody>
-          <a:bodyPr/>
-          <a:lstStyle/>
-          <a:p>
-            <a:r>
-              <a:rPr lang="en-US" dirty="0"/>
-              <a:t>Tidy data uses %&gt;% to forward objects</a:t>
-            </a:r>
-          </a:p>
-        </p:txBody>
-      </p:sp>
-      <p:sp>
-        <p:nvSpPr>
-          <p:cNvPr id="4" name="Footer Placeholder 3"/>
-          <p:cNvSpPr>
-            <a:spLocks noGrp="1"/>
-          </p:cNvSpPr>
-          <p:nvPr>
-            <p:ph type="ftr" sz="quarter" idx="3"/>
-          </p:nvPr>
-        </p:nvSpPr>
-        <p:spPr/>
-        <p:txBody>
-          <a:bodyPr/>
-          <a:lstStyle/>
-          <a:p>
-            <a:r>
-              <a:rPr lang="en-US"/>
-              <a:t>Kwartler</a:t>
-            </a:r>
-            <a:endParaRPr lang="en-US" dirty="0"/>
-          </a:p>
-        </p:txBody>
-      </p:sp>
-      <p:sp>
-        <p:nvSpPr>
-          <p:cNvPr id="5" name="Slide Number Placeholder 4"/>
-          <p:cNvSpPr>
-            <a:spLocks noGrp="1"/>
-          </p:cNvSpPr>
-          <p:nvPr>
-            <p:ph type="sldNum" sz="quarter" idx="4"/>
-          </p:nvPr>
-        </p:nvSpPr>
-        <p:spPr/>
-        <p:txBody>
-          <a:bodyPr/>
-          <a:lstStyle/>
-          <a:p>
-            <a:fld id="{37290FF7-652B-4475-AEAB-8B1A5D23AE09}" type="slidenum">
-              <a:rPr lang="en-US" smtClean="0"/>
-              <a:pPr/>
-              <a:t>9</a:t>
-            </a:fld>
-            <a:endParaRPr lang="en-US" dirty="0"/>
-          </a:p>
-        </p:txBody>
-      </p:sp>
-      <p:sp>
-        <p:nvSpPr>
-          <p:cNvPr id="6" name="Rectangle 5">
-            <a:extLst>
-              <a:ext uri="{FF2B5EF4-FFF2-40B4-BE49-F238E27FC236}">
-                <a16:creationId xmlns:a16="http://schemas.microsoft.com/office/drawing/2014/main" id="{D940A206-84F1-4CFE-A274-27868154639E}"/>
-              </a:ext>
-            </a:extLst>
-          </p:cNvPr>
-          <p:cNvSpPr/>
-          <p:nvPr/>
-        </p:nvSpPr>
-        <p:spPr>
-          <a:xfrm>
-            <a:off x="93786" y="1486900"/>
-            <a:ext cx="8732162" cy="606943"/>
-          </a:xfrm>
-          <a:prstGeom prst="rect">
-            <a:avLst/>
-          </a:prstGeom>
-          <a:solidFill>
-            <a:schemeClr val="accent6"/>
-          </a:solidFill>
-          <a:ln>
-            <a:noFill/>
-          </a:ln>
-          <a:effectLst/>
-        </p:spPr>
-        <p:style>
-          <a:lnRef idx="1">
-            <a:schemeClr val="accent1"/>
-          </a:lnRef>
-          <a:fillRef idx="3">
-            <a:schemeClr val="accent1"/>
-          </a:fillRef>
-          <a:effectRef idx="2">
-            <a:schemeClr val="accent1"/>
-          </a:effectRef>
-          <a:fontRef idx="minor">
-            <a:schemeClr val="lt1"/>
-          </a:fontRef>
-        </p:style>
-        <p:txBody>
-          <a:bodyPr rtlCol="0" anchor="ctr"/>
-          <a:lstStyle/>
-          <a:p>
-            <a:pPr algn="ctr"/>
-            <a:r>
-              <a:rPr lang="en-US" sz="1600" dirty="0"/>
-              <a:t>In the “</a:t>
-            </a:r>
-            <a:r>
-              <a:rPr lang="en-US" sz="1600" dirty="0" err="1"/>
-              <a:t>tidyverse</a:t>
-            </a:r>
-            <a:r>
-              <a:rPr lang="en-US" sz="1600" dirty="0"/>
-              <a:t>” code is structured so it is more easily read using the %&gt;%.   The data format is a </a:t>
-            </a:r>
-            <a:r>
-              <a:rPr lang="en-US" sz="1600" dirty="0" err="1"/>
-              <a:t>tibble</a:t>
-            </a:r>
-            <a:r>
-              <a:rPr lang="en-US" sz="1600" dirty="0"/>
-              <a:t> usually not a data frame.</a:t>
-            </a:r>
-          </a:p>
-        </p:txBody>
-      </p:sp>
-      <p:sp>
-        <p:nvSpPr>
-          <p:cNvPr id="7" name="Rectangle 1">
-            <a:extLst>
-              <a:ext uri="{FF2B5EF4-FFF2-40B4-BE49-F238E27FC236}">
-                <a16:creationId xmlns:a16="http://schemas.microsoft.com/office/drawing/2014/main" id="{39FFFAF3-C96C-462B-B199-570A86DECD12}"/>
-              </a:ext>
-            </a:extLst>
-          </p:cNvPr>
-          <p:cNvSpPr>
-            <a:spLocks noChangeArrowheads="1"/>
-          </p:cNvSpPr>
-          <p:nvPr/>
-        </p:nvSpPr>
-        <p:spPr bwMode="auto">
-          <a:xfrm>
-            <a:off x="83656" y="2373204"/>
-            <a:ext cx="857927" cy="338554"/>
-          </a:xfrm>
-          <a:prstGeom prst="rect">
-            <a:avLst/>
-          </a:prstGeom>
-          <a:solidFill>
-            <a:schemeClr val="bg1">
-              <a:lumMod val="85000"/>
-            </a:schemeClr>
-          </a:solidFill>
-          <a:ln>
-            <a:noFill/>
-          </a:ln>
-          <a:effectLst/>
-        </p:spPr>
-        <p:txBody>
-          <a:bodyPr vert="horz" wrap="none" lIns="91440" tIns="45720" rIns="91440" bIns="45720" numCol="1" anchor="ctr" anchorCtr="0" compatLnSpc="1">
-            <a:prstTxWarp prst="textNoShape">
-              <a:avLst/>
-            </a:prstTxWarp>
-            <a:spAutoFit/>
-          </a:bodyPr>
-          <a:lstStyle/>
-          <a:p>
-            <a:pPr marL="0" marR="0" lvl="0" indent="0" algn="l" defTabSz="914400" rtl="0" eaLnBrk="0" fontAlgn="base" latinLnBrk="0" hangingPunct="0">
-              <a:lnSpc>
-                <a:spcPct val="100000"/>
-              </a:lnSpc>
-              <a:spcBef>
-                <a:spcPct val="0"/>
-              </a:spcBef>
-              <a:spcAft>
-                <a:spcPct val="0"/>
-              </a:spcAft>
-              <a:buClrTx/>
-              <a:buSzTx/>
-              <a:buFontTx/>
-              <a:buNone/>
-              <a:tabLst/>
-            </a:pPr>
-            <a:r>
-              <a:rPr kumimoji="0" lang="en-US" altLang="en-US" sz="1600" b="0" i="0" u="none" strike="noStrike" cap="none" normalizeH="0" baseline="0" dirty="0" err="1">
-                <a:ln>
-                  <a:noFill/>
-                </a:ln>
-                <a:solidFill>
-                  <a:srgbClr val="000000"/>
-                </a:solidFill>
-                <a:effectLst/>
-                <a:latin typeface="Consolas" panose="020B0609020204030204" pitchFamily="49" charset="0"/>
-                <a:cs typeface="Consolas" panose="020B0609020204030204" pitchFamily="49" charset="0"/>
-              </a:rPr>
-              <a:t>mtcars</a:t>
-            </a:r>
-            <a:endParaRPr kumimoji="0" lang="en-US" altLang="en-US" sz="3200" b="0" i="0" u="none" strike="noStrike" cap="none" normalizeH="0" baseline="0" dirty="0">
-              <a:ln>
-                <a:noFill/>
-              </a:ln>
-              <a:solidFill>
-                <a:schemeClr val="tx1"/>
-              </a:solidFill>
-              <a:effectLst/>
-              <a:latin typeface="Consolas" panose="020B0609020204030204" pitchFamily="49" charset="0"/>
-              <a:cs typeface="Consolas" panose="020B0609020204030204" pitchFamily="49" charset="0"/>
-            </a:endParaRPr>
-          </a:p>
-        </p:txBody>
-      </p:sp>
-      <p:sp>
-        <p:nvSpPr>
-          <p:cNvPr id="8" name="TextBox 7">
-            <a:extLst>
-              <a:ext uri="{FF2B5EF4-FFF2-40B4-BE49-F238E27FC236}">
-                <a16:creationId xmlns:a16="http://schemas.microsoft.com/office/drawing/2014/main" id="{58D0FEC3-CC7F-4699-A9B3-61C9844AF549}"/>
-              </a:ext>
-            </a:extLst>
-          </p:cNvPr>
-          <p:cNvSpPr txBox="1"/>
-          <p:nvPr/>
-        </p:nvSpPr>
-        <p:spPr>
-          <a:xfrm>
-            <a:off x="93786" y="4287177"/>
-            <a:ext cx="8732162" cy="404092"/>
-          </a:xfrm>
-          <a:prstGeom prst="rect">
-            <a:avLst/>
-          </a:prstGeom>
-          <a:solidFill>
-            <a:schemeClr val="accent6"/>
-          </a:solidFill>
-          <a:ln>
-            <a:noFill/>
-          </a:ln>
-          <a:effectLst/>
-        </p:spPr>
-        <p:style>
-          <a:lnRef idx="1">
-            <a:schemeClr val="accent1"/>
-          </a:lnRef>
-          <a:fillRef idx="3">
-            <a:schemeClr val="accent1"/>
-          </a:fillRef>
-          <a:effectRef idx="2">
-            <a:schemeClr val="accent1"/>
-          </a:effectRef>
-          <a:fontRef idx="minor">
-            <a:schemeClr val="lt1"/>
-          </a:fontRef>
-        </p:style>
-        <p:txBody>
-          <a:bodyPr rot="0" spcFirstLastPara="0" vertOverflow="overflow" horzOverflow="overflow" vert="horz" wrap="square" lIns="91440" tIns="45720" rIns="91440" bIns="45720" numCol="1" spcCol="0" rtlCol="0" fromWordArt="0" anchor="ctr" anchorCtr="0" forceAA="0" compatLnSpc="1">
-            <a:prstTxWarp prst="textNoShape">
-              <a:avLst/>
-            </a:prstTxWarp>
-            <a:noAutofit/>
-          </a:bodyPr>
-          <a:lstStyle>
-            <a:defPPr marR="0" lvl="0" algn="l" rtl="0">
-              <a:lnSpc>
-                <a:spcPct val="100000"/>
-              </a:lnSpc>
-              <a:spcBef>
-                <a:spcPts val="0"/>
-              </a:spcBef>
-              <a:spcAft>
-                <a:spcPts val="0"/>
-              </a:spcAft>
-            </a:defPPr>
-            <a:lvl1pPr algn="ctr">
-              <a:defRPr>
-                <a:solidFill>
-                  <a:schemeClr val="lt1"/>
-                </a:solidFill>
-                <a:latin typeface="+mn-lt"/>
-                <a:ea typeface="+mn-ea"/>
-                <a:cs typeface="+mn-cs"/>
-              </a:defRPr>
-            </a:lvl1pPr>
-            <a:lvl2pPr>
-              <a:defRPr>
-                <a:solidFill>
-                  <a:schemeClr val="lt1"/>
-                </a:solidFill>
-                <a:latin typeface="+mn-lt"/>
-                <a:ea typeface="+mn-ea"/>
-                <a:cs typeface="+mn-cs"/>
-              </a:defRPr>
-            </a:lvl2pPr>
-            <a:lvl3pPr>
-              <a:defRPr>
-                <a:solidFill>
-                  <a:schemeClr val="lt1"/>
-                </a:solidFill>
-                <a:latin typeface="+mn-lt"/>
-                <a:ea typeface="+mn-ea"/>
-                <a:cs typeface="+mn-cs"/>
-              </a:defRPr>
-            </a:lvl3pPr>
-            <a:lvl4pPr>
-              <a:defRPr>
-                <a:solidFill>
-                  <a:schemeClr val="lt1"/>
-                </a:solidFill>
-                <a:latin typeface="+mn-lt"/>
-                <a:ea typeface="+mn-ea"/>
-                <a:cs typeface="+mn-cs"/>
-              </a:defRPr>
-            </a:lvl4pPr>
-            <a:lvl5pPr>
-              <a:defRPr>
-                <a:solidFill>
-                  <a:schemeClr val="lt1"/>
-                </a:solidFill>
-                <a:latin typeface="+mn-lt"/>
-                <a:ea typeface="+mn-ea"/>
-                <a:cs typeface="+mn-cs"/>
-              </a:defRPr>
-            </a:lvl5pPr>
-            <a:lvl6pPr>
-              <a:defRPr>
-                <a:solidFill>
-                  <a:schemeClr val="lt1"/>
-                </a:solidFill>
-                <a:latin typeface="+mn-lt"/>
-                <a:ea typeface="+mn-ea"/>
-                <a:cs typeface="+mn-cs"/>
-              </a:defRPr>
-            </a:lvl6pPr>
-            <a:lvl7pPr>
-              <a:defRPr>
-                <a:solidFill>
-                  <a:schemeClr val="lt1"/>
-                </a:solidFill>
-                <a:latin typeface="+mn-lt"/>
-                <a:ea typeface="+mn-ea"/>
-                <a:cs typeface="+mn-cs"/>
-              </a:defRPr>
-            </a:lvl7pPr>
-            <a:lvl8pPr>
-              <a:defRPr>
-                <a:solidFill>
-                  <a:schemeClr val="lt1"/>
-                </a:solidFill>
-                <a:latin typeface="+mn-lt"/>
-                <a:ea typeface="+mn-ea"/>
-                <a:cs typeface="+mn-cs"/>
-              </a:defRPr>
-            </a:lvl8pPr>
-            <a:lvl9pPr>
-              <a:defRPr>
-                <a:solidFill>
-                  <a:schemeClr val="lt1"/>
-                </a:solidFill>
-                <a:latin typeface="+mn-lt"/>
-                <a:ea typeface="+mn-ea"/>
-                <a:cs typeface="+mn-cs"/>
-              </a:defRPr>
-            </a:lvl9pPr>
-          </a:lstStyle>
-          <a:p>
-            <a:r>
-              <a:rPr lang="en-US" sz="1400" dirty="0"/>
-              <a:t>This reads as “Using the </a:t>
-            </a:r>
-            <a:r>
-              <a:rPr lang="en-US" sz="1400" dirty="0" err="1"/>
-              <a:t>mtcars</a:t>
-            </a:r>
-            <a:r>
-              <a:rPr lang="en-US" sz="1400" dirty="0"/>
-              <a:t> object </a:t>
-            </a:r>
-            <a:r>
-              <a:rPr lang="en-US" sz="1400" i="1" dirty="0"/>
-              <a:t>then</a:t>
-            </a:r>
-            <a:r>
-              <a:rPr lang="en-US" sz="1400" dirty="0"/>
-              <a:t> group by the </a:t>
-            </a:r>
-            <a:r>
-              <a:rPr lang="en-US" sz="1400" dirty="0" err="1"/>
-              <a:t>cyl</a:t>
-            </a:r>
-            <a:r>
-              <a:rPr lang="en-US" sz="1400" dirty="0"/>
-              <a:t> vector </a:t>
-            </a:r>
-            <a:r>
-              <a:rPr lang="en-US" sz="1400" i="1" dirty="0"/>
-              <a:t>then</a:t>
-            </a:r>
-            <a:r>
-              <a:rPr lang="en-US" sz="1400" dirty="0"/>
-              <a:t> mutate a new variable called rank.</a:t>
-            </a:r>
-          </a:p>
-        </p:txBody>
-      </p:sp>
-      <p:sp>
-        <p:nvSpPr>
-          <p:cNvPr id="9" name="Rectangle 1">
-            <a:extLst>
-              <a:ext uri="{FF2B5EF4-FFF2-40B4-BE49-F238E27FC236}">
-                <a16:creationId xmlns:a16="http://schemas.microsoft.com/office/drawing/2014/main" id="{CF8A6302-CAB8-124A-955D-B4D0F625DF0E}"/>
-              </a:ext>
-            </a:extLst>
-          </p:cNvPr>
-          <p:cNvSpPr>
-            <a:spLocks noChangeArrowheads="1"/>
-          </p:cNvSpPr>
-          <p:nvPr/>
-        </p:nvSpPr>
-        <p:spPr bwMode="auto">
-          <a:xfrm>
-            <a:off x="83656" y="2784021"/>
-            <a:ext cx="2877711" cy="338554"/>
-          </a:xfrm>
-          <a:prstGeom prst="rect">
-            <a:avLst/>
-          </a:prstGeom>
-          <a:solidFill>
-            <a:schemeClr val="bg1">
-              <a:lumMod val="85000"/>
-            </a:schemeClr>
-          </a:solidFill>
-          <a:ln>
-            <a:noFill/>
-          </a:ln>
-          <a:effectLst/>
-        </p:spPr>
-        <p:txBody>
-          <a:bodyPr vert="horz" wrap="none" lIns="91440" tIns="45720" rIns="91440" bIns="45720" numCol="1" anchor="ctr" anchorCtr="0" compatLnSpc="1">
-            <a:prstTxWarp prst="textNoShape">
-              <a:avLst/>
-            </a:prstTxWarp>
-            <a:spAutoFit/>
-          </a:bodyPr>
-          <a:lstStyle/>
-          <a:p>
-            <a:pPr marL="0" marR="0" lvl="0" indent="0" algn="l" defTabSz="914400" rtl="0" eaLnBrk="0" fontAlgn="base" latinLnBrk="0" hangingPunct="0">
-              <a:lnSpc>
-                <a:spcPct val="100000"/>
-              </a:lnSpc>
-              <a:spcBef>
-                <a:spcPct val="0"/>
-              </a:spcBef>
-              <a:spcAft>
-                <a:spcPct val="0"/>
-              </a:spcAft>
-              <a:buClrTx/>
-              <a:buSzTx/>
-              <a:buFontTx/>
-              <a:buNone/>
-              <a:tabLst/>
-            </a:pPr>
-            <a:r>
-              <a:rPr kumimoji="0" lang="en-US" altLang="en-US" sz="1600" b="0" i="0" u="none" strike="noStrike" cap="none" normalizeH="0" baseline="0" dirty="0" err="1">
-                <a:ln>
-                  <a:noFill/>
-                </a:ln>
-                <a:solidFill>
-                  <a:srgbClr val="000000"/>
-                </a:solidFill>
-                <a:effectLst/>
-                <a:latin typeface="Consolas" panose="020B0609020204030204" pitchFamily="49" charset="0"/>
-                <a:cs typeface="Consolas" panose="020B0609020204030204" pitchFamily="49" charset="0"/>
-              </a:rPr>
-              <a:t>mtcars</a:t>
-            </a:r>
-            <a:r>
-              <a:rPr kumimoji="0" lang="en-US" altLang="en-US" sz="1600" b="0" i="0" u="none" strike="noStrike" cap="none" normalizeH="0" baseline="0" dirty="0">
-                <a:ln>
-                  <a:noFill/>
-                </a:ln>
-                <a:solidFill>
-                  <a:srgbClr val="000000"/>
-                </a:solidFill>
-                <a:effectLst/>
-                <a:latin typeface="Consolas" panose="020B0609020204030204" pitchFamily="49" charset="0"/>
-                <a:cs typeface="Consolas" panose="020B0609020204030204" pitchFamily="49" charset="0"/>
-              </a:rPr>
-              <a:t> %&gt;% </a:t>
-            </a:r>
-            <a:r>
-              <a:rPr kumimoji="0" lang="en-US" altLang="en-US" sz="1600" b="0" i="0" u="none" strike="noStrike" cap="none" normalizeH="0" baseline="0" dirty="0" err="1">
-                <a:ln>
-                  <a:noFill/>
-                </a:ln>
-                <a:solidFill>
-                  <a:srgbClr val="000000"/>
-                </a:solidFill>
-                <a:effectLst/>
-                <a:latin typeface="Consolas" panose="020B0609020204030204" pitchFamily="49" charset="0"/>
-                <a:cs typeface="Consolas" panose="020B0609020204030204" pitchFamily="49" charset="0"/>
-              </a:rPr>
-              <a:t>group_by</a:t>
-            </a:r>
-            <a:r>
-              <a:rPr kumimoji="0" lang="en-US" altLang="en-US" sz="1600" b="0" i="0" u="none" strike="noStrike" cap="none" normalizeH="0" baseline="0" dirty="0">
-                <a:ln>
-                  <a:noFill/>
-                </a:ln>
-                <a:solidFill>
-                  <a:srgbClr val="000000"/>
-                </a:solidFill>
-                <a:effectLst/>
-                <a:latin typeface="Consolas" panose="020B0609020204030204" pitchFamily="49" charset="0"/>
-                <a:cs typeface="Consolas" panose="020B0609020204030204" pitchFamily="49" charset="0"/>
-              </a:rPr>
-              <a:t>(</a:t>
-            </a:r>
-            <a:r>
-              <a:rPr kumimoji="0" lang="en-US" altLang="en-US" sz="1600" b="0" i="0" u="none" strike="noStrike" cap="none" normalizeH="0" baseline="0" dirty="0" err="1">
-                <a:ln>
-                  <a:noFill/>
-                </a:ln>
-                <a:solidFill>
-                  <a:srgbClr val="000000"/>
-                </a:solidFill>
-                <a:effectLst/>
-                <a:latin typeface="Consolas" panose="020B0609020204030204" pitchFamily="49" charset="0"/>
-                <a:cs typeface="Consolas" panose="020B0609020204030204" pitchFamily="49" charset="0"/>
-              </a:rPr>
-              <a:t>cyl</a:t>
-            </a:r>
-            <a:r>
-              <a:rPr kumimoji="0" lang="en-US" altLang="en-US" sz="1600" b="0" i="0" u="none" strike="noStrike" cap="none" normalizeH="0" baseline="0" dirty="0">
-                <a:ln>
-                  <a:noFill/>
-                </a:ln>
-                <a:solidFill>
-                  <a:srgbClr val="000000"/>
-                </a:solidFill>
-                <a:effectLst/>
-                <a:latin typeface="Consolas" panose="020B0609020204030204" pitchFamily="49" charset="0"/>
-                <a:cs typeface="Consolas" panose="020B0609020204030204" pitchFamily="49" charset="0"/>
-              </a:rPr>
-              <a:t>)</a:t>
-            </a:r>
-            <a:endParaRPr kumimoji="0" lang="en-US" altLang="en-US" sz="3200" b="0" i="0" u="none" strike="noStrike" cap="none" normalizeH="0" baseline="0" dirty="0">
-              <a:ln>
-                <a:noFill/>
-              </a:ln>
-              <a:solidFill>
-                <a:schemeClr val="tx1"/>
-              </a:solidFill>
-              <a:effectLst/>
-              <a:latin typeface="Consolas" panose="020B0609020204030204" pitchFamily="49" charset="0"/>
-              <a:cs typeface="Consolas" panose="020B0609020204030204" pitchFamily="49" charset="0"/>
-            </a:endParaRPr>
-          </a:p>
-        </p:txBody>
-      </p:sp>
-      <p:sp>
-        <p:nvSpPr>
-          <p:cNvPr id="10" name="Rectangle 1">
-            <a:extLst>
-              <a:ext uri="{FF2B5EF4-FFF2-40B4-BE49-F238E27FC236}">
-                <a16:creationId xmlns:a16="http://schemas.microsoft.com/office/drawing/2014/main" id="{07D57D57-56CA-7F4C-84C6-D92D128A29ED}"/>
-              </a:ext>
-            </a:extLst>
-          </p:cNvPr>
-          <p:cNvSpPr>
-            <a:spLocks noChangeArrowheads="1"/>
-          </p:cNvSpPr>
-          <p:nvPr/>
-        </p:nvSpPr>
-        <p:spPr bwMode="auto">
-          <a:xfrm>
-            <a:off x="83656" y="3210227"/>
-            <a:ext cx="6445995" cy="307777"/>
-          </a:xfrm>
-          <a:prstGeom prst="rect">
-            <a:avLst/>
-          </a:prstGeom>
-          <a:solidFill>
-            <a:schemeClr val="bg1">
-              <a:lumMod val="85000"/>
-            </a:schemeClr>
-          </a:solidFill>
-          <a:ln>
-            <a:noFill/>
-          </a:ln>
-          <a:effectLst/>
-        </p:spPr>
-        <p:txBody>
-          <a:bodyPr vert="horz" wrap="none" lIns="91440" tIns="45720" rIns="91440" bIns="45720" numCol="1" anchor="ctr" anchorCtr="0" compatLnSpc="1">
-            <a:prstTxWarp prst="textNoShape">
-              <a:avLst/>
-            </a:prstTxWarp>
-            <a:spAutoFit/>
-          </a:bodyPr>
-          <a:lstStyle/>
-          <a:p>
-            <a:pPr marL="0" marR="0" lvl="0" indent="0" algn="l" defTabSz="914400" rtl="0" eaLnBrk="0" fontAlgn="base" latinLnBrk="0" hangingPunct="0">
-              <a:lnSpc>
-                <a:spcPct val="100000"/>
-              </a:lnSpc>
-              <a:spcBef>
-                <a:spcPct val="0"/>
-              </a:spcBef>
-              <a:spcAft>
-                <a:spcPct val="0"/>
-              </a:spcAft>
-              <a:buClrTx/>
-              <a:buSzTx/>
-              <a:buFontTx/>
-              <a:buNone/>
-              <a:tabLst/>
-            </a:pPr>
-            <a:r>
-              <a:rPr kumimoji="0" lang="en-US" altLang="en-US" sz="1400" b="0" i="0" u="none" strike="noStrike" cap="none" normalizeH="0" baseline="0" dirty="0" err="1">
-                <a:ln>
-                  <a:noFill/>
-                </a:ln>
-                <a:solidFill>
-                  <a:srgbClr val="000000"/>
-                </a:solidFill>
-                <a:effectLst/>
-                <a:latin typeface="Consolas" panose="020B0609020204030204" pitchFamily="49" charset="0"/>
-                <a:cs typeface="Consolas" panose="020B0609020204030204" pitchFamily="49" charset="0"/>
-              </a:rPr>
-              <a:t>mtcars</a:t>
-            </a:r>
-            <a:r>
-              <a:rPr kumimoji="0" lang="en-US" altLang="en-US" sz="1400" b="0" i="0" u="none" strike="noStrike" cap="none" normalizeH="0" baseline="0" dirty="0">
-                <a:ln>
-                  <a:noFill/>
-                </a:ln>
-                <a:solidFill>
-                  <a:srgbClr val="000000"/>
-                </a:solidFill>
-                <a:effectLst/>
-                <a:latin typeface="Consolas" panose="020B0609020204030204" pitchFamily="49" charset="0"/>
-                <a:cs typeface="Consolas" panose="020B0609020204030204" pitchFamily="49" charset="0"/>
-              </a:rPr>
-              <a:t> %&gt;% </a:t>
-            </a:r>
-            <a:r>
-              <a:rPr kumimoji="0" lang="en-US" altLang="en-US" sz="1400" b="0" i="0" u="none" strike="noStrike" cap="none" normalizeH="0" baseline="0" dirty="0" err="1">
-                <a:ln>
-                  <a:noFill/>
-                </a:ln>
-                <a:solidFill>
-                  <a:srgbClr val="000000"/>
-                </a:solidFill>
-                <a:effectLst/>
-                <a:latin typeface="Consolas" panose="020B0609020204030204" pitchFamily="49" charset="0"/>
-                <a:cs typeface="Consolas" panose="020B0609020204030204" pitchFamily="49" charset="0"/>
-              </a:rPr>
-              <a:t>group_by</a:t>
-            </a:r>
-            <a:r>
-              <a:rPr kumimoji="0" lang="en-US" altLang="en-US" sz="1400" b="0" i="0" u="none" strike="noStrike" cap="none" normalizeH="0" baseline="0" dirty="0">
-                <a:ln>
-                  <a:noFill/>
-                </a:ln>
-                <a:solidFill>
-                  <a:srgbClr val="000000"/>
-                </a:solidFill>
-                <a:effectLst/>
-                <a:latin typeface="Consolas" panose="020B0609020204030204" pitchFamily="49" charset="0"/>
-                <a:cs typeface="Consolas" panose="020B0609020204030204" pitchFamily="49" charset="0"/>
-              </a:rPr>
-              <a:t>(</a:t>
-            </a:r>
-            <a:r>
-              <a:rPr kumimoji="0" lang="en-US" altLang="en-US" sz="1400" b="0" i="0" u="none" strike="noStrike" cap="none" normalizeH="0" baseline="0" dirty="0" err="1">
-                <a:ln>
-                  <a:noFill/>
-                </a:ln>
-                <a:solidFill>
-                  <a:srgbClr val="000000"/>
-                </a:solidFill>
-                <a:effectLst/>
-                <a:latin typeface="Consolas" panose="020B0609020204030204" pitchFamily="49" charset="0"/>
-                <a:cs typeface="Consolas" panose="020B0609020204030204" pitchFamily="49" charset="0"/>
-              </a:rPr>
-              <a:t>cyl</a:t>
-            </a:r>
-            <a:r>
-              <a:rPr kumimoji="0" lang="en-US" altLang="en-US" sz="1400" b="0" i="0" u="none" strike="noStrike" cap="none" normalizeH="0" baseline="0" dirty="0">
-                <a:ln>
-                  <a:noFill/>
-                </a:ln>
-                <a:solidFill>
-                  <a:srgbClr val="000000"/>
-                </a:solidFill>
-                <a:effectLst/>
-                <a:latin typeface="Consolas" panose="020B0609020204030204" pitchFamily="49" charset="0"/>
-                <a:cs typeface="Consolas" panose="020B0609020204030204" pitchFamily="49" charset="0"/>
-              </a:rPr>
-              <a:t>) %&gt;% mutate(rank = </a:t>
-            </a:r>
-            <a:r>
-              <a:rPr kumimoji="0" lang="en-US" altLang="en-US" sz="1400" b="0" i="0" u="none" strike="noStrike" cap="none" normalizeH="0" baseline="0" dirty="0" err="1">
-                <a:ln>
-                  <a:noFill/>
-                </a:ln>
-                <a:solidFill>
-                  <a:srgbClr val="000000"/>
-                </a:solidFill>
-                <a:effectLst/>
-                <a:latin typeface="Consolas" panose="020B0609020204030204" pitchFamily="49" charset="0"/>
-                <a:cs typeface="Consolas" panose="020B0609020204030204" pitchFamily="49" charset="0"/>
-              </a:rPr>
-              <a:t>min_rank</a:t>
-            </a:r>
-            <a:r>
-              <a:rPr kumimoji="0" lang="en-US" altLang="en-US" sz="1400" b="0" i="0" u="none" strike="noStrike" cap="none" normalizeH="0" baseline="0" dirty="0">
-                <a:ln>
-                  <a:noFill/>
-                </a:ln>
-                <a:solidFill>
-                  <a:srgbClr val="000000"/>
-                </a:solidFill>
-                <a:effectLst/>
-                <a:latin typeface="Consolas" panose="020B0609020204030204" pitchFamily="49" charset="0"/>
-                <a:cs typeface="Consolas" panose="020B0609020204030204" pitchFamily="49" charset="0"/>
-              </a:rPr>
-              <a:t>(desc(mpg)))</a:t>
-            </a:r>
-            <a:endParaRPr kumimoji="0" lang="en-US" altLang="en-US" sz="2800" b="0" i="0" u="none" strike="noStrike" cap="none" normalizeH="0" baseline="0" dirty="0">
-              <a:ln>
-                <a:noFill/>
-              </a:ln>
-              <a:solidFill>
-                <a:schemeClr val="tx1"/>
-              </a:solidFill>
-              <a:effectLst/>
-              <a:latin typeface="Consolas" panose="020B0609020204030204" pitchFamily="49" charset="0"/>
-              <a:cs typeface="Consolas" panose="020B0609020204030204" pitchFamily="49" charset="0"/>
-            </a:endParaRPr>
-          </a:p>
-        </p:txBody>
-      </p:sp>
-      <p:cxnSp>
-        <p:nvCxnSpPr>
-          <p:cNvPr id="14" name="Straight Connector 13">
-            <a:extLst>
-              <a:ext uri="{FF2B5EF4-FFF2-40B4-BE49-F238E27FC236}">
-                <a16:creationId xmlns:a16="http://schemas.microsoft.com/office/drawing/2014/main" id="{8BAC59A9-F984-CB46-92E7-894ED2476187}"/>
-              </a:ext>
-            </a:extLst>
-          </p:cNvPr>
-          <p:cNvCxnSpPr/>
-          <p:nvPr/>
-        </p:nvCxnSpPr>
-        <p:spPr>
-          <a:xfrm>
-            <a:off x="6798363" y="6549885"/>
-            <a:ext cx="0" cy="182880"/>
-          </a:xfrm>
-          <a:prstGeom prst="line">
-            <a:avLst/>
-          </a:prstGeom>
-          <a:ln>
-            <a:solidFill>
-              <a:schemeClr val="bg1">
-                <a:lumMod val="85000"/>
-              </a:schemeClr>
-            </a:solidFill>
-          </a:ln>
-        </p:spPr>
-        <p:style>
-          <a:lnRef idx="1">
-            <a:schemeClr val="accent1"/>
-          </a:lnRef>
-          <a:fillRef idx="0">
-            <a:schemeClr val="accent1"/>
-          </a:fillRef>
-          <a:effectRef idx="0">
-            <a:schemeClr val="accent1"/>
-          </a:effectRef>
-          <a:fontRef idx="minor">
-            <a:schemeClr val="tx1"/>
-          </a:fontRef>
-        </p:style>
-      </p:cxnSp>
-      <p:cxnSp>
-        <p:nvCxnSpPr>
-          <p:cNvPr id="15" name="Straight Connector 14">
-            <a:extLst>
-              <a:ext uri="{FF2B5EF4-FFF2-40B4-BE49-F238E27FC236}">
-                <a16:creationId xmlns:a16="http://schemas.microsoft.com/office/drawing/2014/main" id="{85BF6A31-01F7-434F-A98A-1D421D75C4AA}"/>
-              </a:ext>
-            </a:extLst>
-          </p:cNvPr>
-          <p:cNvCxnSpPr/>
-          <p:nvPr/>
-        </p:nvCxnSpPr>
-        <p:spPr>
-          <a:xfrm>
-            <a:off x="7076661" y="4664763"/>
-            <a:ext cx="182880" cy="0"/>
-          </a:xfrm>
-          <a:prstGeom prst="line">
-            <a:avLst/>
-          </a:prstGeom>
-          <a:ln>
-            <a:solidFill>
-              <a:schemeClr val="bg1">
-                <a:lumMod val="85000"/>
-              </a:schemeClr>
-            </a:solidFill>
-          </a:ln>
-        </p:spPr>
-        <p:style>
-          <a:lnRef idx="1">
-            <a:schemeClr val="accent1"/>
-          </a:lnRef>
-          <a:fillRef idx="0">
-            <a:schemeClr val="accent1"/>
-          </a:fillRef>
-          <a:effectRef idx="0">
-            <a:schemeClr val="accent1"/>
-          </a:effectRef>
-          <a:fontRef idx="minor">
-            <a:schemeClr val="tx1"/>
-          </a:fontRef>
-        </p:style>
-      </p:cxnSp>
-    </p:spTree>
-    <p:extLst>
-      <p:ext uri="{BB962C8B-B14F-4D97-AF65-F5344CB8AC3E}">
-        <p14:creationId xmlns:p14="http://schemas.microsoft.com/office/powerpoint/2010/main" val="1819628604"/>
-      </p:ext>
-    </p:extLst>
-  </p:cSld>
-  <p:clrMapOvr>
-    <a:masterClrMapping/>
-  </p:clrMapOvr>
-  <p:timing>
-    <p:tnLst>
-      <p:par>
-        <p:cTn id="1" dur="indefinite" restart="never" nodeType="tmRoot">
-          <p:childTnLst>
-            <p:seq concurrent="1" nextAc="seek">
-              <p:cTn id="2" dur="indefinite" nodeType="mainSeq">
-                <p:childTnLst>
-                  <p:par>
-                    <p:cTn id="3" fill="hold">
-                      <p:stCondLst>
-                        <p:cond delay="indefinite"/>
-                      </p:stCondLst>
-                      <p:childTnLst>
-                        <p:par>
-                          <p:cTn id="4" fill="hold">
-                            <p:stCondLst>
-                              <p:cond delay="0"/>
-                            </p:stCondLst>
-                            <p:childTnLst>
-                              <p:par>
-                                <p:cTn id="5" presetID="1" presetClass="entr" presetSubtype="0" fill="hold" grpId="0" nodeType="clickEffect">
-                                  <p:stCondLst>
-                                    <p:cond delay="0"/>
-                                  </p:stCondLst>
-                                  <p:childTnLst>
-                                    <p:set>
-                                      <p:cBhvr>
-                                        <p:cTn id="6" dur="1" fill="hold">
-                                          <p:stCondLst>
-                                            <p:cond delay="0"/>
-                                          </p:stCondLst>
-                                        </p:cTn>
-                                        <p:tgtEl>
-                                          <p:spTgt spid="7"/>
-                                        </p:tgtEl>
-                                        <p:attrNameLst>
-                                          <p:attrName>style.visibility</p:attrName>
-                                        </p:attrNameLst>
-                                      </p:cBhvr>
-                                      <p:to>
-                                        <p:strVal val="visible"/>
-                                      </p:to>
-                                    </p:set>
-                                  </p:childTnLst>
-                                </p:cTn>
-                              </p:par>
-                            </p:childTnLst>
-                          </p:cTn>
-                        </p:par>
-                      </p:childTnLst>
-                    </p:cTn>
-                  </p:par>
-                  <p:par>
-                    <p:cTn id="7" fill="hold">
-                      <p:stCondLst>
-                        <p:cond delay="indefinite"/>
-                      </p:stCondLst>
-                      <p:childTnLst>
-                        <p:par>
-                          <p:cTn id="8" fill="hold">
-                            <p:stCondLst>
-                              <p:cond delay="0"/>
-                            </p:stCondLst>
-                            <p:childTnLst>
-                              <p:par>
-                                <p:cTn id="9" presetID="1" presetClass="entr" presetSubtype="0" fill="hold" grpId="0" nodeType="clickEffect">
-                                  <p:stCondLst>
-                                    <p:cond delay="0"/>
-                                  </p:stCondLst>
-                                  <p:childTnLst>
-                                    <p:set>
-                                      <p:cBhvr>
-                                        <p:cTn id="10" dur="1" fill="hold">
-                                          <p:stCondLst>
-                                            <p:cond delay="0"/>
-                                          </p:stCondLst>
-                                        </p:cTn>
-                                        <p:tgtEl>
-                                          <p:spTgt spid="9"/>
-                                        </p:tgtEl>
-                                        <p:attrNameLst>
-                                          <p:attrName>style.visibility</p:attrName>
-                                        </p:attrNameLst>
-                                      </p:cBhvr>
-                                      <p:to>
-                                        <p:strVal val="visible"/>
-                                      </p:to>
-                                    </p:set>
-                                  </p:childTnLst>
-                                </p:cTn>
-                              </p:par>
-                            </p:childTnLst>
-                          </p:cTn>
-                        </p:par>
-                      </p:childTnLst>
-                    </p:cTn>
-                  </p:par>
-                  <p:par>
-                    <p:cTn id="11" fill="hold">
-                      <p:stCondLst>
-                        <p:cond delay="indefinite"/>
-                      </p:stCondLst>
-                      <p:childTnLst>
-                        <p:par>
-                          <p:cTn id="12" fill="hold">
-                            <p:stCondLst>
-                              <p:cond delay="0"/>
-                            </p:stCondLst>
-                            <p:childTnLst>
-                              <p:par>
-                                <p:cTn id="13" presetID="1" presetClass="entr" presetSubtype="0" fill="hold" grpId="0" nodeType="clickEffect">
-                                  <p:stCondLst>
-                                    <p:cond delay="0"/>
-                                  </p:stCondLst>
-                                  <p:childTnLst>
-                                    <p:set>
-                                      <p:cBhvr>
-                                        <p:cTn id="14" dur="1" fill="hold">
-                                          <p:stCondLst>
-                                            <p:cond delay="0"/>
-                                          </p:stCondLst>
-                                        </p:cTn>
-                                        <p:tgtEl>
-                                          <p:spTgt spid="10"/>
-                                        </p:tgtEl>
-                                        <p:attrNameLst>
-                                          <p:attrName>style.visibility</p:attrName>
-                                        </p:attrNameLst>
-                                      </p:cBhvr>
-                                      <p:to>
-                                        <p:strVal val="visible"/>
-                                      </p:to>
-                                    </p:set>
-                                  </p:childTnLst>
-                                </p:cTn>
-                              </p:par>
-                              <p:par>
-                                <p:cTn id="15" presetID="1" presetClass="entr" presetSubtype="0" fill="hold" grpId="0" nodeType="withEffect">
-                                  <p:stCondLst>
-                                    <p:cond delay="0"/>
-                                  </p:stCondLst>
-                                  <p:childTnLst>
-                                    <p:set>
-                                      <p:cBhvr>
-                                        <p:cTn id="16" dur="1" fill="hold">
-                                          <p:stCondLst>
-                                            <p:cond delay="0"/>
-                                          </p:stCondLst>
-                                        </p:cTn>
-                                        <p:tgtEl>
-                                          <p:spTgt spid="8"/>
-                                        </p:tgtEl>
-                                        <p:attrNameLst>
-                                          <p:attrName>style.visibility</p:attrName>
-                                        </p:attrNameLst>
-                                      </p:cBhvr>
-                                      <p:to>
-                                        <p:strVal val="visible"/>
-                                      </p:to>
-                                    </p:set>
-                                  </p:childTnLst>
-                                </p:cTn>
-                              </p:par>
-                            </p:childTnLst>
-                          </p:cTn>
-                        </p:par>
-                      </p:childTnLst>
-                    </p:cTn>
-                  </p:par>
-                </p:childTnLst>
-              </p:cTn>
-              <p:prevCondLst>
-                <p:cond evt="onPrev" delay="0">
-                  <p:tgtEl>
-                    <p:sldTgt/>
-                  </p:tgtEl>
-                </p:cond>
-              </p:prevCondLst>
-              <p:nextCondLst>
-                <p:cond evt="onNext" delay="0">
-                  <p:tgtEl>
-                    <p:sldTgt/>
-                  </p:tgtEl>
-                </p:cond>
-              </p:nextCondLst>
-            </p:seq>
-          </p:childTnLst>
-        </p:cTn>
-      </p:par>
-    </p:tnLst>
-    <p:bldLst>
-      <p:bldP spid="7" grpId="0" animBg="1"/>
-      <p:bldP spid="8" grpId="0" animBg="1"/>
-      <p:bldP spid="9" grpId="0" animBg="1"/>
-      <p:bldP spid="10" grpId="0" animBg="1"/>
-    </p:bldLst>
-  </p:timing>
 </p:sld>
 </file>
 

</xml_diff>

<commit_message>
update with new lesson
</commit_message>
<xml_diff>
--- a/student_lessons/C_Sentiment_Unsupervised/Day3_liveA_SentimentReview.pptx
+++ b/student_lessons/C_Sentiment_Unsupervised/Day3_liveA_SentimentReview.pptx
@@ -5,7 +5,7 @@
     <p:sldMasterId id="2147483660" r:id="rId1"/>
   </p:sldMasterIdLst>
   <p:notesMasterIdLst>
-    <p:notesMasterId r:id="rId17"/>
+    <p:notesMasterId r:id="rId19"/>
   </p:notesMasterIdLst>
   <p:sldIdLst>
     <p:sldId id="836" r:id="rId2"/>
@@ -14,15 +14,17 @@
     <p:sldId id="833" r:id="rId5"/>
     <p:sldId id="834" r:id="rId6"/>
     <p:sldId id="837" r:id="rId7"/>
-    <p:sldId id="835" r:id="rId8"/>
-    <p:sldId id="832" r:id="rId9"/>
-    <p:sldId id="820" r:id="rId10"/>
-    <p:sldId id="819" r:id="rId11"/>
-    <p:sldId id="821" r:id="rId12"/>
-    <p:sldId id="740" r:id="rId13"/>
-    <p:sldId id="822" r:id="rId14"/>
-    <p:sldId id="823" r:id="rId15"/>
-    <p:sldId id="824" r:id="rId16"/>
+    <p:sldId id="838" r:id="rId8"/>
+    <p:sldId id="835" r:id="rId9"/>
+    <p:sldId id="832" r:id="rId10"/>
+    <p:sldId id="820" r:id="rId11"/>
+    <p:sldId id="819" r:id="rId12"/>
+    <p:sldId id="821" r:id="rId13"/>
+    <p:sldId id="740" r:id="rId14"/>
+    <p:sldId id="822" r:id="rId15"/>
+    <p:sldId id="823" r:id="rId16"/>
+    <p:sldId id="824" r:id="rId17"/>
+    <p:sldId id="839" r:id="rId18"/>
   </p:sldIdLst>
   <p:sldSz cx="9144000" cy="6858000" type="screen4x3"/>
   <p:notesSz cx="6858000" cy="9144000"/>
@@ -5004,7 +5006,7 @@
           <a:p>
             <a:fld id="{B0C0A60C-850A-4EA4-9C14-A8FE98B94505}" type="datetimeFigureOut">
               <a:rPr lang="en-US" smtClean="0"/>
-              <a:t>6/15/21</a:t>
+              <a:t>6/14/22</a:t>
             </a:fld>
             <a:endParaRPr lang="en-US"/>
           </a:p>
@@ -5487,7 +5489,7 @@
           <a:p>
             <a:fld id="{5738B90E-0779-4C36-915C-6F05FCD89456}" type="datetime1">
               <a:rPr lang="en-US" smtClean="0"/>
-              <a:t>6/15/21</a:t>
+              <a:t>6/14/22</a:t>
             </a:fld>
             <a:endParaRPr lang="en-US"/>
           </a:p>
@@ -5684,7 +5686,7 @@
           <a:p>
             <a:fld id="{7B9EA29D-D431-42FE-B7B6-AAE4454C77D3}" type="datetime1">
               <a:rPr lang="en-US" smtClean="0"/>
-              <a:t>6/15/21</a:t>
+              <a:t>6/14/22</a:t>
             </a:fld>
             <a:endParaRPr lang="en-US"/>
           </a:p>
@@ -6039,7 +6041,7 @@
           <a:p>
             <a:fld id="{690D8A1E-EA8F-46C1-B891-AE0C00D9C314}" type="datetime1">
               <a:rPr lang="en-US" smtClean="0"/>
-              <a:t>6/15/21</a:t>
+              <a:t>6/14/22</a:t>
             </a:fld>
             <a:endParaRPr lang="en-US"/>
           </a:p>
@@ -6347,7 +6349,7 @@
           <a:p>
             <a:fld id="{D753EFC8-4232-4598-94F6-94C0EBAFC469}" type="datetime1">
               <a:rPr lang="en-US" smtClean="0"/>
-              <a:t>6/15/21</a:t>
+              <a:t>6/14/22</a:t>
             </a:fld>
             <a:endParaRPr lang="en-US"/>
           </a:p>
@@ -6676,7 +6678,7 @@
           <a:p>
             <a:fld id="{F3161074-1C18-4AE7-957D-F18524378C85}" type="datetime1">
               <a:rPr lang="en-US" smtClean="0"/>
-              <a:t>6/15/21</a:t>
+              <a:t>6/14/22</a:t>
             </a:fld>
             <a:endParaRPr lang="en-US"/>
           </a:p>
@@ -6929,7 +6931,7 @@
           <a:p>
             <a:fld id="{69BE256C-8D9A-4404-B47D-41A1AE514425}" type="datetime1">
               <a:rPr lang="en-US" smtClean="0"/>
-              <a:t>6/15/21</a:t>
+              <a:t>6/14/22</a:t>
             </a:fld>
             <a:endParaRPr lang="en-US"/>
           </a:p>
@@ -7377,7 +7379,7 @@
           <a:p>
             <a:fld id="{66CB2154-9035-4012-8189-BAAB61C5A5EE}" type="datetime1">
               <a:rPr lang="en-US" smtClean="0"/>
-              <a:t>6/15/21</a:t>
+              <a:t>6/14/22</a:t>
             </a:fld>
             <a:endParaRPr lang="en-US"/>
           </a:p>
@@ -7565,7 +7567,7 @@
           <a:p>
             <a:fld id="{6700A58B-DD98-43D0-B791-721480A02982}" type="datetime1">
               <a:rPr lang="en-US" smtClean="0"/>
-              <a:t>6/15/21</a:t>
+              <a:t>6/14/22</a:t>
             </a:fld>
             <a:endParaRPr lang="en-US"/>
           </a:p>
@@ -7771,7 +7773,7 @@
           <a:p>
             <a:fld id="{7DB6E382-4F61-4E24-BE1A-377EC83D0E3A}" type="datetime1">
               <a:rPr lang="en-US" smtClean="0"/>
-              <a:t>6/15/21</a:t>
+              <a:t>6/14/22</a:t>
             </a:fld>
             <a:endParaRPr lang="en-US"/>
           </a:p>
@@ -8177,7 +8179,7 @@
           <a:p>
             <a:fld id="{4142EED6-FC16-45B9-B8C4-2BC5DBA88325}" type="datetime1">
               <a:rPr lang="en-US" smtClean="0"/>
-              <a:t>6/15/21</a:t>
+              <a:t>6/14/22</a:t>
             </a:fld>
             <a:endParaRPr lang="en-US"/>
           </a:p>
@@ -8509,7 +8511,7 @@
           <a:p>
             <a:fld id="{DF59512B-4F1D-43D7-8819-2F53FEF69650}" type="datetime1">
               <a:rPr lang="en-US" smtClean="0"/>
-              <a:t>6/15/21</a:t>
+              <a:t>6/14/22</a:t>
             </a:fld>
             <a:endParaRPr lang="en-US"/>
           </a:p>
@@ -8799,7 +8801,7 @@
           <a:p>
             <a:fld id="{08437B94-E2BF-44DC-ADC5-B05FC9934E9D}" type="datetime1">
               <a:rPr lang="en-US" smtClean="0"/>
-              <a:t>6/15/21</a:t>
+              <a:t>6/14/22</a:t>
             </a:fld>
             <a:endParaRPr lang="en-US"/>
           </a:p>
@@ -9572,7 +9574,7 @@
                 </a:spcAft>
                 <a:defRPr/>
               </a:pPr>
-              <a:t>6/15/21</a:t>
+              <a:t>6/14/22</a:t>
             </a:fld>
             <a:endParaRPr lang="en-US" sz="1000">
               <a:solidFill>
@@ -9752,7 +9754,7 @@
           <a:p>
             <a:fld id="{6700A58B-DD98-43D0-B791-721480A02982}" type="datetime1">
               <a:rPr lang="en-US" smtClean="0"/>
-              <a:t>6/15/21</a:t>
+              <a:t>6/14/22</a:t>
             </a:fld>
             <a:endParaRPr lang="en-US"/>
           </a:p>
@@ -9775,7 +9777,7 @@
           <a:p>
             <a:r>
               <a:rPr lang="en-US" dirty="0"/>
-              <a:t>Tidy data uses %&gt;% to forward objects</a:t>
+              <a:t>The pipe operator…%&gt;%</a:t>
             </a:r>
           </a:p>
         </p:txBody>
@@ -9822,6 +9824,255 @@
               <a:rPr lang="en-US" smtClean="0"/>
               <a:pPr/>
               <a:t>10</a:t>
+            </a:fld>
+            <a:endParaRPr lang="en-US" dirty="0"/>
+          </a:p>
+        </p:txBody>
+      </p:sp>
+      <p:pic>
+        <p:nvPicPr>
+          <p:cNvPr id="4098" name="Picture 2" descr="Image result for this is not a pipe meme"/>
+          <p:cNvPicPr>
+            <a:picLocks noChangeAspect="1" noChangeArrowheads="1"/>
+          </p:cNvPicPr>
+          <p:nvPr/>
+        </p:nvPicPr>
+        <p:blipFill>
+          <a:blip r:embed="rId2">
+            <a:extLst>
+              <a:ext uri="{28A0092B-C50C-407E-A947-70E740481C1C}">
+                <a14:useLocalDpi xmlns:a14="http://schemas.microsoft.com/office/drawing/2010/main" val="0"/>
+              </a:ext>
+            </a:extLst>
+          </a:blip>
+          <a:srcRect/>
+          <a:stretch>
+            <a:fillRect/>
+          </a:stretch>
+        </p:blipFill>
+        <p:spPr bwMode="auto">
+          <a:xfrm>
+            <a:off x="1307828" y="1567411"/>
+            <a:ext cx="4488832" cy="4488832"/>
+          </a:xfrm>
+          <a:prstGeom prst="rect">
+            <a:avLst/>
+          </a:prstGeom>
+          <a:noFill/>
+          <a:extLst>
+            <a:ext uri="{909E8E84-426E-40DD-AFC4-6F175D3DCCD1}">
+              <a14:hiddenFill xmlns:a14="http://schemas.microsoft.com/office/drawing/2010/main">
+                <a:solidFill>
+                  <a:srgbClr val="FFFFFF"/>
+                </a:solidFill>
+              </a14:hiddenFill>
+            </a:ext>
+          </a:extLst>
+        </p:spPr>
+      </p:pic>
+      <p:cxnSp>
+        <p:nvCxnSpPr>
+          <p:cNvPr id="9" name="Straight Connector 8">
+            <a:extLst>
+              <a:ext uri="{FF2B5EF4-FFF2-40B4-BE49-F238E27FC236}">
+                <a16:creationId xmlns:a16="http://schemas.microsoft.com/office/drawing/2014/main" id="{2A75CC4F-E3E5-2C4F-9EF9-4C1A692E411C}"/>
+              </a:ext>
+            </a:extLst>
+          </p:cNvPr>
+          <p:cNvCxnSpPr/>
+          <p:nvPr/>
+        </p:nvCxnSpPr>
+        <p:spPr>
+          <a:xfrm>
+            <a:off x="6798363" y="6549885"/>
+            <a:ext cx="0" cy="182880"/>
+          </a:xfrm>
+          <a:prstGeom prst="line">
+            <a:avLst/>
+          </a:prstGeom>
+          <a:ln>
+            <a:solidFill>
+              <a:schemeClr val="bg1">
+                <a:lumMod val="85000"/>
+              </a:schemeClr>
+            </a:solidFill>
+          </a:ln>
+        </p:spPr>
+        <p:style>
+          <a:lnRef idx="1">
+            <a:schemeClr val="accent1"/>
+          </a:lnRef>
+          <a:fillRef idx="0">
+            <a:schemeClr val="accent1"/>
+          </a:fillRef>
+          <a:effectRef idx="0">
+            <a:schemeClr val="accent1"/>
+          </a:effectRef>
+          <a:fontRef idx="minor">
+            <a:schemeClr val="tx1"/>
+          </a:fontRef>
+        </p:style>
+      </p:cxnSp>
+      <p:cxnSp>
+        <p:nvCxnSpPr>
+          <p:cNvPr id="10" name="Straight Connector 9">
+            <a:extLst>
+              <a:ext uri="{FF2B5EF4-FFF2-40B4-BE49-F238E27FC236}">
+                <a16:creationId xmlns:a16="http://schemas.microsoft.com/office/drawing/2014/main" id="{92F44094-04EC-A942-BAFB-7B1F866FE348}"/>
+              </a:ext>
+            </a:extLst>
+          </p:cNvPr>
+          <p:cNvCxnSpPr/>
+          <p:nvPr/>
+        </p:nvCxnSpPr>
+        <p:spPr>
+          <a:xfrm>
+            <a:off x="7076661" y="4664763"/>
+            <a:ext cx="182880" cy="0"/>
+          </a:xfrm>
+          <a:prstGeom prst="line">
+            <a:avLst/>
+          </a:prstGeom>
+          <a:ln>
+            <a:solidFill>
+              <a:schemeClr val="bg1">
+                <a:lumMod val="85000"/>
+              </a:schemeClr>
+            </a:solidFill>
+          </a:ln>
+        </p:spPr>
+        <p:style>
+          <a:lnRef idx="1">
+            <a:schemeClr val="accent1"/>
+          </a:lnRef>
+          <a:fillRef idx="0">
+            <a:schemeClr val="accent1"/>
+          </a:fillRef>
+          <a:effectRef idx="0">
+            <a:schemeClr val="accent1"/>
+          </a:effectRef>
+          <a:fontRef idx="minor">
+            <a:schemeClr val="tx1"/>
+          </a:fontRef>
+        </p:style>
+      </p:cxnSp>
+    </p:spTree>
+    <p:extLst>
+      <p:ext uri="{BB962C8B-B14F-4D97-AF65-F5344CB8AC3E}">
+        <p14:creationId xmlns:p14="http://schemas.microsoft.com/office/powerpoint/2010/main" val="514940039"/>
+      </p:ext>
+    </p:extLst>
+  </p:cSld>
+  <p:clrMapOvr>
+    <a:masterClrMapping/>
+  </p:clrMapOvr>
+</p:sld>
+</file>
+
+<file path=ppt/slides/slide11.xml><?xml version="1.0" encoding="utf-8"?>
+<p:sld xmlns:a="http://schemas.openxmlformats.org/drawingml/2006/main" xmlns:r="http://schemas.openxmlformats.org/officeDocument/2006/relationships" xmlns:p="http://schemas.openxmlformats.org/presentationml/2006/main">
+  <p:cSld>
+    <p:spTree>
+      <p:nvGrpSpPr>
+        <p:cNvPr id="1" name=""/>
+        <p:cNvGrpSpPr/>
+        <p:nvPr/>
+      </p:nvGrpSpPr>
+      <p:grpSpPr>
+        <a:xfrm>
+          <a:off x="0" y="0"/>
+          <a:ext cx="0" cy="0"/>
+          <a:chOff x="0" y="0"/>
+          <a:chExt cx="0" cy="0"/>
+        </a:xfrm>
+      </p:grpSpPr>
+      <p:sp>
+        <p:nvSpPr>
+          <p:cNvPr id="2" name="Date Placeholder 1"/>
+          <p:cNvSpPr>
+            <a:spLocks noGrp="1"/>
+          </p:cNvSpPr>
+          <p:nvPr>
+            <p:ph type="dt" sz="half" idx="10"/>
+          </p:nvPr>
+        </p:nvSpPr>
+        <p:spPr/>
+        <p:txBody>
+          <a:bodyPr/>
+          <a:lstStyle/>
+          <a:p>
+            <a:fld id="{6700A58B-DD98-43D0-B791-721480A02982}" type="datetime1">
+              <a:rPr lang="en-US" smtClean="0"/>
+              <a:t>6/14/22</a:t>
+            </a:fld>
+            <a:endParaRPr lang="en-US"/>
+          </a:p>
+        </p:txBody>
+      </p:sp>
+      <p:sp>
+        <p:nvSpPr>
+          <p:cNvPr id="3" name="Title 2"/>
+          <p:cNvSpPr>
+            <a:spLocks noGrp="1"/>
+          </p:cNvSpPr>
+          <p:nvPr>
+            <p:ph type="title"/>
+          </p:nvPr>
+        </p:nvSpPr>
+        <p:spPr/>
+        <p:txBody>
+          <a:bodyPr/>
+          <a:lstStyle/>
+          <a:p>
+            <a:r>
+              <a:rPr lang="en-US" dirty="0"/>
+              <a:t>Tidy data uses %&gt;% to forward objects</a:t>
+            </a:r>
+          </a:p>
+        </p:txBody>
+      </p:sp>
+      <p:sp>
+        <p:nvSpPr>
+          <p:cNvPr id="4" name="Footer Placeholder 3"/>
+          <p:cNvSpPr>
+            <a:spLocks noGrp="1"/>
+          </p:cNvSpPr>
+          <p:nvPr>
+            <p:ph type="ftr" sz="quarter" idx="3"/>
+          </p:nvPr>
+        </p:nvSpPr>
+        <p:spPr/>
+        <p:txBody>
+          <a:bodyPr/>
+          <a:lstStyle/>
+          <a:p>
+            <a:r>
+              <a:rPr lang="en-US"/>
+              <a:t>Kwartler</a:t>
+            </a:r>
+            <a:endParaRPr lang="en-US" dirty="0"/>
+          </a:p>
+        </p:txBody>
+      </p:sp>
+      <p:sp>
+        <p:nvSpPr>
+          <p:cNvPr id="5" name="Slide Number Placeholder 4"/>
+          <p:cNvSpPr>
+            <a:spLocks noGrp="1"/>
+          </p:cNvSpPr>
+          <p:nvPr>
+            <p:ph type="sldNum" sz="quarter" idx="4"/>
+          </p:nvPr>
+        </p:nvSpPr>
+        <p:spPr/>
+        <p:txBody>
+          <a:bodyPr/>
+          <a:lstStyle/>
+          <a:p>
+            <a:fld id="{37290FF7-652B-4475-AEAB-8B1A5D23AE09}" type="slidenum">
+              <a:rPr lang="en-US" smtClean="0"/>
+              <a:pPr/>
+              <a:t>11</a:t>
             </a:fld>
             <a:endParaRPr lang="en-US" dirty="0"/>
           </a:p>
@@ -10809,7 +11060,7 @@
 </p:sld>
 </file>
 
-<file path=ppt/slides/slide11.xml><?xml version="1.0" encoding="utf-8"?>
+<file path=ppt/slides/slide12.xml><?xml version="1.0" encoding="utf-8"?>
 <p:sld xmlns:a="http://schemas.openxmlformats.org/drawingml/2006/main" xmlns:r="http://schemas.openxmlformats.org/officeDocument/2006/relationships" xmlns:p="http://schemas.openxmlformats.org/presentationml/2006/main">
   <p:cSld>
     <p:spTree>
@@ -10843,7 +11094,7 @@
           <a:p>
             <a:fld id="{6700A58B-DD98-43D0-B791-721480A02982}" type="datetime1">
               <a:rPr lang="en-US" smtClean="0"/>
-              <a:t>6/15/21</a:t>
+              <a:t>6/14/22</a:t>
             </a:fld>
             <a:endParaRPr lang="en-US"/>
           </a:p>
@@ -10912,7 +11163,7 @@
             <a:fld id="{37290FF7-652B-4475-AEAB-8B1A5D23AE09}" type="slidenum">
               <a:rPr lang="en-US" smtClean="0"/>
               <a:pPr/>
-              <a:t>11</a:t>
+              <a:t>12</a:t>
             </a:fld>
             <a:endParaRPr lang="en-US" dirty="0"/>
           </a:p>
@@ -11047,7 +11298,7 @@
 </p:sld>
 </file>
 
-<file path=ppt/slides/slide12.xml><?xml version="1.0" encoding="utf-8"?>
+<file path=ppt/slides/slide13.xml><?xml version="1.0" encoding="utf-8"?>
 <p:sld xmlns:a="http://schemas.openxmlformats.org/drawingml/2006/main" xmlns:r="http://schemas.openxmlformats.org/officeDocument/2006/relationships" xmlns:p="http://schemas.openxmlformats.org/presentationml/2006/main">
   <p:cSld>
     <p:spTree>
@@ -11088,7 +11339,7 @@
             <a:fld id="{6700A58B-DD98-43D0-B791-721480A02982}" type="datetime1">
               <a:rPr lang="en-US" smtClean="0"/>
               <a:pPr/>
-              <a:t>6/15/21</a:t>
+              <a:t>6/14/22</a:t>
             </a:fld>
             <a:endParaRPr lang="en-US"/>
           </a:p>
@@ -11180,7 +11431,7 @@
             <a:fld id="{37290FF7-652B-4475-AEAB-8B1A5D23AE09}" type="slidenum">
               <a:rPr lang="en-US" smtClean="0"/>
               <a:pPr/>
-              <a:t>12</a:t>
+              <a:t>13</a:t>
             </a:fld>
             <a:endParaRPr lang="en-US"/>
           </a:p>
@@ -11513,7 +11764,7 @@
 </p:sld>
 </file>
 
-<file path=ppt/slides/slide13.xml><?xml version="1.0" encoding="utf-8"?>
+<file path=ppt/slides/slide14.xml><?xml version="1.0" encoding="utf-8"?>
 <p:sld xmlns:a="http://schemas.openxmlformats.org/drawingml/2006/main" xmlns:r="http://schemas.openxmlformats.org/officeDocument/2006/relationships" xmlns:p="http://schemas.openxmlformats.org/presentationml/2006/main">
   <p:cSld>
     <p:spTree>
@@ -11547,7 +11798,7 @@
           <a:p>
             <a:fld id="{6700A58B-DD98-43D0-B791-721480A02982}" type="datetime1">
               <a:rPr lang="en-US" smtClean="0"/>
-              <a:t>6/15/21</a:t>
+              <a:t>6/14/22</a:t>
             </a:fld>
             <a:endParaRPr lang="en-US"/>
           </a:p>
@@ -11621,7 +11872,7 @@
             <a:fld id="{37290FF7-652B-4475-AEAB-8B1A5D23AE09}" type="slidenum">
               <a:rPr lang="en-US" smtClean="0"/>
               <a:pPr/>
-              <a:t>13</a:t>
+              <a:t>14</a:t>
             </a:fld>
             <a:endParaRPr lang="en-US" dirty="0"/>
           </a:p>
@@ -13917,7 +14168,7 @@
 </p:sld>
 </file>
 
-<file path=ppt/slides/slide14.xml><?xml version="1.0" encoding="utf-8"?>
+<file path=ppt/slides/slide15.xml><?xml version="1.0" encoding="utf-8"?>
 <p:sld xmlns:a="http://schemas.openxmlformats.org/drawingml/2006/main" xmlns:r="http://schemas.openxmlformats.org/officeDocument/2006/relationships" xmlns:p="http://schemas.openxmlformats.org/presentationml/2006/main">
   <p:cSld>
     <p:spTree>
@@ -13951,7 +14202,7 @@
           <a:p>
             <a:fld id="{6700A58B-DD98-43D0-B791-721480A02982}" type="datetime1">
               <a:rPr lang="en-US" smtClean="0"/>
-              <a:t>6/15/21</a:t>
+              <a:t>6/14/22</a:t>
             </a:fld>
             <a:endParaRPr lang="en-US"/>
           </a:p>
@@ -14020,7 +14271,7 @@
             <a:fld id="{37290FF7-652B-4475-AEAB-8B1A5D23AE09}" type="slidenum">
               <a:rPr lang="en-US" smtClean="0"/>
               <a:pPr/>
-              <a:t>14</a:t>
+              <a:t>15</a:t>
             </a:fld>
             <a:endParaRPr lang="en-US" dirty="0"/>
           </a:p>
@@ -15232,7 +15483,7 @@
 </p:sld>
 </file>
 
-<file path=ppt/slides/slide15.xml><?xml version="1.0" encoding="utf-8"?>
+<file path=ppt/slides/slide16.xml><?xml version="1.0" encoding="utf-8"?>
 <p:sld xmlns:a="http://schemas.openxmlformats.org/drawingml/2006/main" xmlns:r="http://schemas.openxmlformats.org/officeDocument/2006/relationships" xmlns:p="http://schemas.openxmlformats.org/presentationml/2006/main">
   <p:cSld>
     <p:spTree>
@@ -15266,7 +15517,7 @@
           <a:p>
             <a:fld id="{6700A58B-DD98-43D0-B791-721480A02982}" type="datetime1">
               <a:rPr lang="en-US" smtClean="0"/>
-              <a:t>6/15/21</a:t>
+              <a:t>6/14/22</a:t>
             </a:fld>
             <a:endParaRPr lang="en-US"/>
           </a:p>
@@ -15335,7 +15586,7 @@
             <a:fld id="{37290FF7-652B-4475-AEAB-8B1A5D23AE09}" type="slidenum">
               <a:rPr lang="en-US" smtClean="0"/>
               <a:pPr/>
-              <a:t>15</a:t>
+              <a:t>16</a:t>
             </a:fld>
             <a:endParaRPr lang="en-US" dirty="0"/>
           </a:p>
@@ -15513,6 +15764,241 @@
 </p:sld>
 </file>
 
+<file path=ppt/slides/slide17.xml><?xml version="1.0" encoding="utf-8"?>
+<p:sld xmlns:a="http://schemas.openxmlformats.org/drawingml/2006/main" xmlns:r="http://schemas.openxmlformats.org/officeDocument/2006/relationships" xmlns:p="http://schemas.openxmlformats.org/presentationml/2006/main">
+  <p:cSld>
+    <p:spTree>
+      <p:nvGrpSpPr>
+        <p:cNvPr id="1" name=""/>
+        <p:cNvGrpSpPr/>
+        <p:nvPr/>
+      </p:nvGrpSpPr>
+      <p:grpSpPr>
+        <a:xfrm>
+          <a:off x="0" y="0"/>
+          <a:ext cx="0" cy="0"/>
+          <a:chOff x="0" y="0"/>
+          <a:chExt cx="0" cy="0"/>
+        </a:xfrm>
+      </p:grpSpPr>
+      <p:sp>
+        <p:nvSpPr>
+          <p:cNvPr id="2" name="Date Placeholder 1">
+            <a:extLst>
+              <a:ext uri="{FF2B5EF4-FFF2-40B4-BE49-F238E27FC236}">
+                <a16:creationId xmlns:a16="http://schemas.microsoft.com/office/drawing/2014/main" id="{953CA1A6-698F-924B-AD3D-8100CC44743D}"/>
+              </a:ext>
+            </a:extLst>
+          </p:cNvPr>
+          <p:cNvSpPr>
+            <a:spLocks noGrp="1"/>
+          </p:cNvSpPr>
+          <p:nvPr>
+            <p:ph type="dt" sz="half" idx="10"/>
+          </p:nvPr>
+        </p:nvSpPr>
+        <p:spPr/>
+        <p:txBody>
+          <a:bodyPr/>
+          <a:lstStyle/>
+          <a:p>
+            <a:fld id="{6700A58B-DD98-43D0-B791-721480A02982}" type="datetime1">
+              <a:rPr lang="en-US" smtClean="0"/>
+              <a:t>6/14/22</a:t>
+            </a:fld>
+            <a:endParaRPr lang="en-US"/>
+          </a:p>
+        </p:txBody>
+      </p:sp>
+      <p:sp>
+        <p:nvSpPr>
+          <p:cNvPr id="3" name="Title 2">
+            <a:extLst>
+              <a:ext uri="{FF2B5EF4-FFF2-40B4-BE49-F238E27FC236}">
+                <a16:creationId xmlns:a16="http://schemas.microsoft.com/office/drawing/2014/main" id="{8BAC9960-2A4B-5048-B74D-E9186122093F}"/>
+              </a:ext>
+            </a:extLst>
+          </p:cNvPr>
+          <p:cNvSpPr>
+            <a:spLocks noGrp="1"/>
+          </p:cNvSpPr>
+          <p:nvPr>
+            <p:ph type="title"/>
+          </p:nvPr>
+        </p:nvSpPr>
+        <p:spPr/>
+        <p:txBody>
+          <a:bodyPr/>
+          <a:lstStyle/>
+          <a:p>
+            <a:r>
+              <a:rPr lang="en-US" dirty="0"/>
+              <a:t>Now let’s use tidy text w/multiple corpora</a:t>
+            </a:r>
+          </a:p>
+        </p:txBody>
+      </p:sp>
+      <p:sp>
+        <p:nvSpPr>
+          <p:cNvPr id="4" name="Footer Placeholder 3">
+            <a:extLst>
+              <a:ext uri="{FF2B5EF4-FFF2-40B4-BE49-F238E27FC236}">
+                <a16:creationId xmlns:a16="http://schemas.microsoft.com/office/drawing/2014/main" id="{818AC6A0-1E43-344B-98E7-D0BC03F979F6}"/>
+              </a:ext>
+            </a:extLst>
+          </p:cNvPr>
+          <p:cNvSpPr>
+            <a:spLocks noGrp="1"/>
+          </p:cNvSpPr>
+          <p:nvPr>
+            <p:ph type="ftr" sz="quarter" idx="3"/>
+          </p:nvPr>
+        </p:nvSpPr>
+        <p:spPr/>
+        <p:txBody>
+          <a:bodyPr/>
+          <a:lstStyle/>
+          <a:p>
+            <a:r>
+              <a:rPr lang="en-US"/>
+              <a:t>Kwartler</a:t>
+            </a:r>
+            <a:endParaRPr lang="en-US" dirty="0"/>
+          </a:p>
+        </p:txBody>
+      </p:sp>
+      <p:sp>
+        <p:nvSpPr>
+          <p:cNvPr id="5" name="Slide Number Placeholder 4">
+            <a:extLst>
+              <a:ext uri="{FF2B5EF4-FFF2-40B4-BE49-F238E27FC236}">
+                <a16:creationId xmlns:a16="http://schemas.microsoft.com/office/drawing/2014/main" id="{8AFF421C-2294-7948-9D47-F1309BC85146}"/>
+              </a:ext>
+            </a:extLst>
+          </p:cNvPr>
+          <p:cNvSpPr>
+            <a:spLocks noGrp="1"/>
+          </p:cNvSpPr>
+          <p:nvPr>
+            <p:ph type="sldNum" sz="quarter" idx="4"/>
+          </p:nvPr>
+        </p:nvSpPr>
+        <p:spPr/>
+        <p:txBody>
+          <a:bodyPr/>
+          <a:lstStyle/>
+          <a:p>
+            <a:fld id="{37290FF7-652B-4475-AEAB-8B1A5D23AE09}" type="slidenum">
+              <a:rPr lang="en-US" smtClean="0"/>
+              <a:pPr/>
+              <a:t>17</a:t>
+            </a:fld>
+            <a:endParaRPr lang="en-US" dirty="0"/>
+          </a:p>
+        </p:txBody>
+      </p:sp>
+      <p:pic>
+        <p:nvPicPr>
+          <p:cNvPr id="2050" name="Picture 2" descr="Sentiment Analysis - Dr. Evil Air Quotes | Meme Generator">
+            <a:extLst>
+              <a:ext uri="{FF2B5EF4-FFF2-40B4-BE49-F238E27FC236}">
+                <a16:creationId xmlns:a16="http://schemas.microsoft.com/office/drawing/2014/main" id="{1DD7E86F-95E6-AF47-80D4-F819340DBB3B}"/>
+              </a:ext>
+            </a:extLst>
+          </p:cNvPr>
+          <p:cNvPicPr>
+            <a:picLocks noChangeAspect="1" noChangeArrowheads="1"/>
+          </p:cNvPicPr>
+          <p:nvPr/>
+        </p:nvPicPr>
+        <p:blipFill>
+          <a:blip r:embed="rId2">
+            <a:extLst>
+              <a:ext uri="{28A0092B-C50C-407E-A947-70E740481C1C}">
+                <a14:useLocalDpi xmlns:a14="http://schemas.microsoft.com/office/drawing/2010/main" val="0"/>
+              </a:ext>
+            </a:extLst>
+          </a:blip>
+          <a:srcRect/>
+          <a:stretch>
+            <a:fillRect/>
+          </a:stretch>
+        </p:blipFill>
+        <p:spPr bwMode="auto">
+          <a:xfrm>
+            <a:off x="4371125" y="1813636"/>
+            <a:ext cx="4354911" cy="3522639"/>
+          </a:xfrm>
+          <a:prstGeom prst="rect">
+            <a:avLst/>
+          </a:prstGeom>
+          <a:noFill/>
+          <a:extLst>
+            <a:ext uri="{909E8E84-426E-40DD-AFC4-6F175D3DCCD1}">
+              <a14:hiddenFill xmlns:a14="http://schemas.microsoft.com/office/drawing/2010/main">
+                <a:solidFill>
+                  <a:srgbClr val="FFFFFF"/>
+                </a:solidFill>
+              </a14:hiddenFill>
+            </a:ext>
+          </a:extLst>
+        </p:spPr>
+      </p:pic>
+      <p:sp>
+        <p:nvSpPr>
+          <p:cNvPr id="6" name="TextBox 5">
+            <a:extLst>
+              <a:ext uri="{FF2B5EF4-FFF2-40B4-BE49-F238E27FC236}">
+                <a16:creationId xmlns:a16="http://schemas.microsoft.com/office/drawing/2014/main" id="{C7434121-B02F-604E-B9F4-587344987F14}"/>
+              </a:ext>
+            </a:extLst>
+          </p:cNvPr>
+          <p:cNvSpPr txBox="1"/>
+          <p:nvPr/>
+        </p:nvSpPr>
+        <p:spPr>
+          <a:xfrm>
+            <a:off x="818866" y="1897039"/>
+            <a:ext cx="2758447" cy="646331"/>
+          </a:xfrm>
+          <a:prstGeom prst="rect">
+            <a:avLst/>
+          </a:prstGeom>
+          <a:noFill/>
+        </p:spPr>
+        <p:txBody>
+          <a:bodyPr wrap="none" rtlCol="0">
+            <a:spAutoFit/>
+          </a:bodyPr>
+          <a:lstStyle/>
+          <a:p>
+            <a:r>
+              <a:rPr lang="en-US" dirty="0"/>
+              <a:t>Open </a:t>
+            </a:r>
+          </a:p>
+          <a:p>
+            <a:r>
+              <a:rPr lang="en-US" dirty="0" err="1"/>
+              <a:t>live_B_tidy_multipleFiles.R</a:t>
+            </a:r>
+            <a:endParaRPr lang="en-US" dirty="0"/>
+          </a:p>
+        </p:txBody>
+      </p:sp>
+    </p:spTree>
+    <p:extLst>
+      <p:ext uri="{BB962C8B-B14F-4D97-AF65-F5344CB8AC3E}">
+        <p14:creationId xmlns:p14="http://schemas.microsoft.com/office/powerpoint/2010/main" val="785594048"/>
+      </p:ext>
+    </p:extLst>
+  </p:cSld>
+  <p:clrMapOvr>
+    <a:masterClrMapping/>
+  </p:clrMapOvr>
+</p:sld>
+</file>
+
 <file path=ppt/slides/slide2.xml><?xml version="1.0" encoding="utf-8"?>
 <p:sld xmlns:a="http://schemas.openxmlformats.org/drawingml/2006/main" xmlns:r="http://schemas.openxmlformats.org/officeDocument/2006/relationships" xmlns:p="http://schemas.openxmlformats.org/presentationml/2006/main">
   <p:cSld>
@@ -15554,7 +16040,7 @@
             <a:fld id="{6700A58B-DD98-43D0-B791-721480A02982}" type="datetime1">
               <a:rPr lang="en-US" smtClean="0"/>
               <a:pPr/>
-              <a:t>6/15/21</a:t>
+              <a:t>6/14/22</a:t>
             </a:fld>
             <a:endParaRPr lang="en-US"/>
           </a:p>
@@ -15961,7 +16447,7 @@
           <a:p>
             <a:fld id="{6700A58B-DD98-43D0-B791-721480A02982}" type="datetime1">
               <a:rPr lang="en-US" smtClean="0"/>
-              <a:t>6/15/21</a:t>
+              <a:t>6/14/22</a:t>
             </a:fld>
             <a:endParaRPr lang="en-US"/>
           </a:p>
@@ -16358,7 +16844,7 @@
           <a:p>
             <a:fld id="{6700A58B-DD98-43D0-B791-721480A02982}" type="datetime1">
               <a:rPr lang="en-US" smtClean="0"/>
-              <a:t>6/15/21</a:t>
+              <a:t>6/14/22</a:t>
             </a:fld>
             <a:endParaRPr lang="en-US"/>
           </a:p>
@@ -16933,7 +17419,7 @@
           <a:p>
             <a:fld id="{6700A58B-DD98-43D0-B791-721480A02982}" type="datetime1">
               <a:rPr lang="en-US" smtClean="0"/>
-              <a:t>6/15/21</a:t>
+              <a:t>6/14/22</a:t>
             </a:fld>
             <a:endParaRPr lang="en-US"/>
           </a:p>
@@ -18004,6 +18490,244 @@
 <file path=ppt/slides/slide7.xml><?xml version="1.0" encoding="utf-8"?>
 <p:sld xmlns:a="http://schemas.openxmlformats.org/drawingml/2006/main" xmlns:r="http://schemas.openxmlformats.org/officeDocument/2006/relationships" xmlns:p="http://schemas.openxmlformats.org/presentationml/2006/main">
   <p:cSld>
+    <p:spTree>
+      <p:nvGrpSpPr>
+        <p:cNvPr id="1" name=""/>
+        <p:cNvGrpSpPr/>
+        <p:nvPr/>
+      </p:nvGrpSpPr>
+      <p:grpSpPr>
+        <a:xfrm>
+          <a:off x="0" y="0"/>
+          <a:ext cx="0" cy="0"/>
+          <a:chOff x="0" y="0"/>
+          <a:chExt cx="0" cy="0"/>
+        </a:xfrm>
+      </p:grpSpPr>
+      <p:sp>
+        <p:nvSpPr>
+          <p:cNvPr id="2" name="Title 1">
+            <a:extLst>
+              <a:ext uri="{FF2B5EF4-FFF2-40B4-BE49-F238E27FC236}">
+                <a16:creationId xmlns:a16="http://schemas.microsoft.com/office/drawing/2014/main" id="{2AC37DB7-3CCB-8A49-92E1-10127BE2D29F}"/>
+              </a:ext>
+            </a:extLst>
+          </p:cNvPr>
+          <p:cNvSpPr>
+            <a:spLocks noGrp="1"/>
+          </p:cNvSpPr>
+          <p:nvPr>
+            <p:ph type="title"/>
+          </p:nvPr>
+        </p:nvSpPr>
+        <p:spPr>
+          <a:xfrm>
+            <a:off x="245659" y="365126"/>
+            <a:ext cx="8598089" cy="591477"/>
+          </a:xfrm>
+        </p:spPr>
+        <p:txBody>
+          <a:bodyPr/>
+          <a:lstStyle/>
+          <a:p>
+            <a:r>
+              <a:rPr lang="en-US" dirty="0"/>
+              <a:t>There are many other sentiment related packages</a:t>
+            </a:r>
+          </a:p>
+        </p:txBody>
+      </p:sp>
+      <p:sp>
+        <p:nvSpPr>
+          <p:cNvPr id="4" name="Date Placeholder 3">
+            <a:extLst>
+              <a:ext uri="{FF2B5EF4-FFF2-40B4-BE49-F238E27FC236}">
+                <a16:creationId xmlns:a16="http://schemas.microsoft.com/office/drawing/2014/main" id="{AAF583E5-9E86-1E4B-97F7-CADAA6B6C085}"/>
+              </a:ext>
+            </a:extLst>
+          </p:cNvPr>
+          <p:cNvSpPr>
+            <a:spLocks noGrp="1"/>
+          </p:cNvSpPr>
+          <p:nvPr>
+            <p:ph type="dt" sz="half" idx="10"/>
+          </p:nvPr>
+        </p:nvSpPr>
+        <p:spPr/>
+        <p:txBody>
+          <a:bodyPr/>
+          <a:lstStyle/>
+          <a:p>
+            <a:fld id="{D753EFC8-4232-4598-94F6-94C0EBAFC469}" type="datetime1">
+              <a:rPr lang="en-US" smtClean="0"/>
+              <a:t>6/14/22</a:t>
+            </a:fld>
+            <a:endParaRPr lang="en-US"/>
+          </a:p>
+        </p:txBody>
+      </p:sp>
+      <p:sp>
+        <p:nvSpPr>
+          <p:cNvPr id="5" name="Footer Placeholder 4">
+            <a:extLst>
+              <a:ext uri="{FF2B5EF4-FFF2-40B4-BE49-F238E27FC236}">
+                <a16:creationId xmlns:a16="http://schemas.microsoft.com/office/drawing/2014/main" id="{6FF2FAB9-3E3D-824B-B486-C526E4C8033C}"/>
+              </a:ext>
+            </a:extLst>
+          </p:cNvPr>
+          <p:cNvSpPr>
+            <a:spLocks noGrp="1"/>
+          </p:cNvSpPr>
+          <p:nvPr>
+            <p:ph type="ftr" sz="quarter" idx="3"/>
+          </p:nvPr>
+        </p:nvSpPr>
+        <p:spPr/>
+        <p:txBody>
+          <a:bodyPr/>
+          <a:lstStyle/>
+          <a:p>
+            <a:r>
+              <a:rPr lang="en-US"/>
+              <a:t>Kwartler</a:t>
+            </a:r>
+            <a:endParaRPr lang="en-US" dirty="0"/>
+          </a:p>
+        </p:txBody>
+      </p:sp>
+      <p:sp>
+        <p:nvSpPr>
+          <p:cNvPr id="6" name="Slide Number Placeholder 5">
+            <a:extLst>
+              <a:ext uri="{FF2B5EF4-FFF2-40B4-BE49-F238E27FC236}">
+                <a16:creationId xmlns:a16="http://schemas.microsoft.com/office/drawing/2014/main" id="{C6F0D766-011F-6F48-A082-E26A0B2CF6F2}"/>
+              </a:ext>
+            </a:extLst>
+          </p:cNvPr>
+          <p:cNvSpPr>
+            <a:spLocks noGrp="1"/>
+          </p:cNvSpPr>
+          <p:nvPr>
+            <p:ph type="sldNum" sz="quarter" idx="4"/>
+          </p:nvPr>
+        </p:nvSpPr>
+        <p:spPr/>
+        <p:txBody>
+          <a:bodyPr/>
+          <a:lstStyle/>
+          <a:p>
+            <a:fld id="{37290FF7-652B-4475-AEAB-8B1A5D23AE09}" type="slidenum">
+              <a:rPr lang="en-US" smtClean="0"/>
+              <a:pPr/>
+              <a:t>7</a:t>
+            </a:fld>
+            <a:endParaRPr lang="en-US" dirty="0"/>
+          </a:p>
+        </p:txBody>
+      </p:sp>
+      <p:pic>
+        <p:nvPicPr>
+          <p:cNvPr id="1026" name="Picture 2" descr="One does not simply &quot;do&quot; sentiment analysis - Lord Of The Rings Boromir One  Does Not Simply Mordor | Meme Generator">
+            <a:extLst>
+              <a:ext uri="{FF2B5EF4-FFF2-40B4-BE49-F238E27FC236}">
+                <a16:creationId xmlns:a16="http://schemas.microsoft.com/office/drawing/2014/main" id="{60401C94-0739-BE49-81DE-DA2B8F7FCDA4}"/>
+              </a:ext>
+            </a:extLst>
+          </p:cNvPr>
+          <p:cNvPicPr>
+            <a:picLocks noChangeAspect="1" noChangeArrowheads="1"/>
+          </p:cNvPicPr>
+          <p:nvPr/>
+        </p:nvPicPr>
+        <p:blipFill>
+          <a:blip r:embed="rId2">
+            <a:extLst>
+              <a:ext uri="{28A0092B-C50C-407E-A947-70E740481C1C}">
+                <a14:useLocalDpi xmlns:a14="http://schemas.microsoft.com/office/drawing/2010/main" val="0"/>
+              </a:ext>
+            </a:extLst>
+          </a:blip>
+          <a:srcRect/>
+          <a:stretch>
+            <a:fillRect/>
+          </a:stretch>
+        </p:blipFill>
+        <p:spPr bwMode="auto">
+          <a:xfrm>
+            <a:off x="4021573" y="1808424"/>
+            <a:ext cx="4844543" cy="2722633"/>
+          </a:xfrm>
+          <a:prstGeom prst="rect">
+            <a:avLst/>
+          </a:prstGeom>
+          <a:noFill/>
+          <a:extLst>
+            <a:ext uri="{909E8E84-426E-40DD-AFC4-6F175D3DCCD1}">
+              <a14:hiddenFill xmlns:a14="http://schemas.microsoft.com/office/drawing/2010/main">
+                <a:solidFill>
+                  <a:srgbClr val="FFFFFF"/>
+                </a:solidFill>
+              </a14:hiddenFill>
+            </a:ext>
+          </a:extLst>
+        </p:spPr>
+      </p:pic>
+      <p:sp>
+        <p:nvSpPr>
+          <p:cNvPr id="7" name="TextBox 6">
+            <a:extLst>
+              <a:ext uri="{FF2B5EF4-FFF2-40B4-BE49-F238E27FC236}">
+                <a16:creationId xmlns:a16="http://schemas.microsoft.com/office/drawing/2014/main" id="{D3BA3998-82F7-0448-AF86-0C4EE053313F}"/>
+              </a:ext>
+            </a:extLst>
+          </p:cNvPr>
+          <p:cNvSpPr txBox="1"/>
+          <p:nvPr/>
+        </p:nvSpPr>
+        <p:spPr>
+          <a:xfrm>
+            <a:off x="491319" y="2565779"/>
+            <a:ext cx="3201454" cy="369332"/>
+          </a:xfrm>
+          <a:prstGeom prst="rect">
+            <a:avLst/>
+          </a:prstGeom>
+          <a:noFill/>
+        </p:spPr>
+        <p:txBody>
+          <a:bodyPr wrap="none" rtlCol="0">
+            <a:spAutoFit/>
+          </a:bodyPr>
+          <a:lstStyle/>
+          <a:p>
+            <a:r>
+              <a:rPr lang="en-US" dirty="0"/>
+              <a:t>Open </a:t>
+            </a:r>
+            <a:r>
+              <a:rPr lang="en-US" dirty="0" err="1"/>
+              <a:t>live_A_other_sentiment.R</a:t>
+            </a:r>
+            <a:endParaRPr lang="en-US" dirty="0"/>
+          </a:p>
+        </p:txBody>
+      </p:sp>
+    </p:spTree>
+    <p:extLst>
+      <p:ext uri="{BB962C8B-B14F-4D97-AF65-F5344CB8AC3E}">
+        <p14:creationId xmlns:p14="http://schemas.microsoft.com/office/powerpoint/2010/main" val="1111091837"/>
+      </p:ext>
+    </p:extLst>
+  </p:cSld>
+  <p:clrMapOvr>
+    <a:masterClrMapping/>
+  </p:clrMapOvr>
+</p:sld>
+</file>
+
+<file path=ppt/slides/slide8.xml><?xml version="1.0" encoding="utf-8"?>
+<p:sld xmlns:a="http://schemas.openxmlformats.org/drawingml/2006/main" xmlns:r="http://schemas.openxmlformats.org/officeDocument/2006/relationships" xmlns:p="http://schemas.openxmlformats.org/presentationml/2006/main">
+  <p:cSld>
     <p:bg>
       <p:bgPr>
         <a:solidFill>
@@ -18284,7 +19008,7 @@
                   <a:spcPts val="600"/>
                 </a:spcAft>
               </a:pPr>
-              <a:t>6/15/21</a:t>
+              <a:t>6/14/22</a:t>
             </a:fld>
             <a:endParaRPr lang="en-US" sz="1200">
               <a:solidFill>
@@ -18348,7 +19072,7 @@
                   <a:spcPts val="600"/>
                 </a:spcAft>
               </a:pPr>
-              <a:t>7</a:t>
+              <a:t>8</a:t>
             </a:fld>
             <a:endParaRPr lang="en-US" sz="1000">
               <a:solidFill>
@@ -18373,7 +19097,7 @@
 </p:sld>
 </file>
 
-<file path=ppt/slides/slide8.xml><?xml version="1.0" encoding="utf-8"?>
+<file path=ppt/slides/slide9.xml><?xml version="1.0" encoding="utf-8"?>
 <p:sld xmlns:a="http://schemas.openxmlformats.org/drawingml/2006/main" xmlns:r="http://schemas.openxmlformats.org/officeDocument/2006/relationships" xmlns:p="http://schemas.openxmlformats.org/presentationml/2006/main">
   <p:cSld>
     <p:spTree>
@@ -18407,7 +19131,7 @@
           <a:p>
             <a:fld id="{6700A58B-DD98-43D0-B791-721480A02982}" type="datetime1">
               <a:rPr lang="en-US" smtClean="0"/>
-              <a:t>6/15/21</a:t>
+              <a:t>6/14/22</a:t>
             </a:fld>
             <a:endParaRPr lang="en-US"/>
           </a:p>
@@ -18481,7 +19205,7 @@
             <a:fld id="{37290FF7-652B-4475-AEAB-8B1A5D23AE09}" type="slidenum">
               <a:rPr lang="en-US" smtClean="0"/>
               <a:pPr/>
-              <a:t>8</a:t>
+              <a:t>9</a:t>
             </a:fld>
             <a:endParaRPr lang="en-US" dirty="0"/>
           </a:p>
@@ -20827,255 +21551,6 @@
 </p:sld>
 </file>
 
-<file path=ppt/slides/slide9.xml><?xml version="1.0" encoding="utf-8"?>
-<p:sld xmlns:a="http://schemas.openxmlformats.org/drawingml/2006/main" xmlns:r="http://schemas.openxmlformats.org/officeDocument/2006/relationships" xmlns:p="http://schemas.openxmlformats.org/presentationml/2006/main">
-  <p:cSld>
-    <p:spTree>
-      <p:nvGrpSpPr>
-        <p:cNvPr id="1" name=""/>
-        <p:cNvGrpSpPr/>
-        <p:nvPr/>
-      </p:nvGrpSpPr>
-      <p:grpSpPr>
-        <a:xfrm>
-          <a:off x="0" y="0"/>
-          <a:ext cx="0" cy="0"/>
-          <a:chOff x="0" y="0"/>
-          <a:chExt cx="0" cy="0"/>
-        </a:xfrm>
-      </p:grpSpPr>
-      <p:sp>
-        <p:nvSpPr>
-          <p:cNvPr id="2" name="Date Placeholder 1"/>
-          <p:cNvSpPr>
-            <a:spLocks noGrp="1"/>
-          </p:cNvSpPr>
-          <p:nvPr>
-            <p:ph type="dt" sz="half" idx="10"/>
-          </p:nvPr>
-        </p:nvSpPr>
-        <p:spPr/>
-        <p:txBody>
-          <a:bodyPr/>
-          <a:lstStyle/>
-          <a:p>
-            <a:fld id="{6700A58B-DD98-43D0-B791-721480A02982}" type="datetime1">
-              <a:rPr lang="en-US" smtClean="0"/>
-              <a:t>6/15/21</a:t>
-            </a:fld>
-            <a:endParaRPr lang="en-US"/>
-          </a:p>
-        </p:txBody>
-      </p:sp>
-      <p:sp>
-        <p:nvSpPr>
-          <p:cNvPr id="3" name="Title 2"/>
-          <p:cNvSpPr>
-            <a:spLocks noGrp="1"/>
-          </p:cNvSpPr>
-          <p:nvPr>
-            <p:ph type="title"/>
-          </p:nvPr>
-        </p:nvSpPr>
-        <p:spPr/>
-        <p:txBody>
-          <a:bodyPr/>
-          <a:lstStyle/>
-          <a:p>
-            <a:r>
-              <a:rPr lang="en-US" dirty="0"/>
-              <a:t>The pipe operator…%&gt;%</a:t>
-            </a:r>
-          </a:p>
-        </p:txBody>
-      </p:sp>
-      <p:sp>
-        <p:nvSpPr>
-          <p:cNvPr id="4" name="Footer Placeholder 3"/>
-          <p:cNvSpPr>
-            <a:spLocks noGrp="1"/>
-          </p:cNvSpPr>
-          <p:nvPr>
-            <p:ph type="ftr" sz="quarter" idx="3"/>
-          </p:nvPr>
-        </p:nvSpPr>
-        <p:spPr/>
-        <p:txBody>
-          <a:bodyPr/>
-          <a:lstStyle/>
-          <a:p>
-            <a:r>
-              <a:rPr lang="en-US"/>
-              <a:t>Kwartler</a:t>
-            </a:r>
-            <a:endParaRPr lang="en-US" dirty="0"/>
-          </a:p>
-        </p:txBody>
-      </p:sp>
-      <p:sp>
-        <p:nvSpPr>
-          <p:cNvPr id="5" name="Slide Number Placeholder 4"/>
-          <p:cNvSpPr>
-            <a:spLocks noGrp="1"/>
-          </p:cNvSpPr>
-          <p:nvPr>
-            <p:ph type="sldNum" sz="quarter" idx="4"/>
-          </p:nvPr>
-        </p:nvSpPr>
-        <p:spPr/>
-        <p:txBody>
-          <a:bodyPr/>
-          <a:lstStyle/>
-          <a:p>
-            <a:fld id="{37290FF7-652B-4475-AEAB-8B1A5D23AE09}" type="slidenum">
-              <a:rPr lang="en-US" smtClean="0"/>
-              <a:pPr/>
-              <a:t>9</a:t>
-            </a:fld>
-            <a:endParaRPr lang="en-US" dirty="0"/>
-          </a:p>
-        </p:txBody>
-      </p:sp>
-      <p:pic>
-        <p:nvPicPr>
-          <p:cNvPr id="4098" name="Picture 2" descr="Image result for this is not a pipe meme"/>
-          <p:cNvPicPr>
-            <a:picLocks noChangeAspect="1" noChangeArrowheads="1"/>
-          </p:cNvPicPr>
-          <p:nvPr/>
-        </p:nvPicPr>
-        <p:blipFill>
-          <a:blip r:embed="rId2">
-            <a:extLst>
-              <a:ext uri="{28A0092B-C50C-407E-A947-70E740481C1C}">
-                <a14:useLocalDpi xmlns:a14="http://schemas.microsoft.com/office/drawing/2010/main" val="0"/>
-              </a:ext>
-            </a:extLst>
-          </a:blip>
-          <a:srcRect/>
-          <a:stretch>
-            <a:fillRect/>
-          </a:stretch>
-        </p:blipFill>
-        <p:spPr bwMode="auto">
-          <a:xfrm>
-            <a:off x="1307828" y="1567411"/>
-            <a:ext cx="4488832" cy="4488832"/>
-          </a:xfrm>
-          <a:prstGeom prst="rect">
-            <a:avLst/>
-          </a:prstGeom>
-          <a:noFill/>
-          <a:extLst>
-            <a:ext uri="{909E8E84-426E-40DD-AFC4-6F175D3DCCD1}">
-              <a14:hiddenFill xmlns:a14="http://schemas.microsoft.com/office/drawing/2010/main">
-                <a:solidFill>
-                  <a:srgbClr val="FFFFFF"/>
-                </a:solidFill>
-              </a14:hiddenFill>
-            </a:ext>
-          </a:extLst>
-        </p:spPr>
-      </p:pic>
-      <p:cxnSp>
-        <p:nvCxnSpPr>
-          <p:cNvPr id="9" name="Straight Connector 8">
-            <a:extLst>
-              <a:ext uri="{FF2B5EF4-FFF2-40B4-BE49-F238E27FC236}">
-                <a16:creationId xmlns:a16="http://schemas.microsoft.com/office/drawing/2014/main" id="{2A75CC4F-E3E5-2C4F-9EF9-4C1A692E411C}"/>
-              </a:ext>
-            </a:extLst>
-          </p:cNvPr>
-          <p:cNvCxnSpPr/>
-          <p:nvPr/>
-        </p:nvCxnSpPr>
-        <p:spPr>
-          <a:xfrm>
-            <a:off x="6798363" y="6549885"/>
-            <a:ext cx="0" cy="182880"/>
-          </a:xfrm>
-          <a:prstGeom prst="line">
-            <a:avLst/>
-          </a:prstGeom>
-          <a:ln>
-            <a:solidFill>
-              <a:schemeClr val="bg1">
-                <a:lumMod val="85000"/>
-              </a:schemeClr>
-            </a:solidFill>
-          </a:ln>
-        </p:spPr>
-        <p:style>
-          <a:lnRef idx="1">
-            <a:schemeClr val="accent1"/>
-          </a:lnRef>
-          <a:fillRef idx="0">
-            <a:schemeClr val="accent1"/>
-          </a:fillRef>
-          <a:effectRef idx="0">
-            <a:schemeClr val="accent1"/>
-          </a:effectRef>
-          <a:fontRef idx="minor">
-            <a:schemeClr val="tx1"/>
-          </a:fontRef>
-        </p:style>
-      </p:cxnSp>
-      <p:cxnSp>
-        <p:nvCxnSpPr>
-          <p:cNvPr id="10" name="Straight Connector 9">
-            <a:extLst>
-              <a:ext uri="{FF2B5EF4-FFF2-40B4-BE49-F238E27FC236}">
-                <a16:creationId xmlns:a16="http://schemas.microsoft.com/office/drawing/2014/main" id="{92F44094-04EC-A942-BAFB-7B1F866FE348}"/>
-              </a:ext>
-            </a:extLst>
-          </p:cNvPr>
-          <p:cNvCxnSpPr/>
-          <p:nvPr/>
-        </p:nvCxnSpPr>
-        <p:spPr>
-          <a:xfrm>
-            <a:off x="7076661" y="4664763"/>
-            <a:ext cx="182880" cy="0"/>
-          </a:xfrm>
-          <a:prstGeom prst="line">
-            <a:avLst/>
-          </a:prstGeom>
-          <a:ln>
-            <a:solidFill>
-              <a:schemeClr val="bg1">
-                <a:lumMod val="85000"/>
-              </a:schemeClr>
-            </a:solidFill>
-          </a:ln>
-        </p:spPr>
-        <p:style>
-          <a:lnRef idx="1">
-            <a:schemeClr val="accent1"/>
-          </a:lnRef>
-          <a:fillRef idx="0">
-            <a:schemeClr val="accent1"/>
-          </a:fillRef>
-          <a:effectRef idx="0">
-            <a:schemeClr val="accent1"/>
-          </a:effectRef>
-          <a:fontRef idx="minor">
-            <a:schemeClr val="tx1"/>
-          </a:fontRef>
-        </p:style>
-      </p:cxnSp>
-    </p:spTree>
-    <p:extLst>
-      <p:ext uri="{BB962C8B-B14F-4D97-AF65-F5344CB8AC3E}">
-        <p14:creationId xmlns:p14="http://schemas.microsoft.com/office/powerpoint/2010/main" val="514940039"/>
-      </p:ext>
-    </p:extLst>
-  </p:cSld>
-  <p:clrMapOvr>
-    <a:masterClrMapping/>
-  </p:clrMapOvr>
-</p:sld>
-</file>
-
 <file path=ppt/theme/theme1.xml><?xml version="1.0" encoding="utf-8"?>
 <a:theme xmlns:a="http://schemas.openxmlformats.org/drawingml/2006/main" name="1_Office Theme">
   <a:themeElements>

</xml_diff>